<commit_message>
Update slides and workshops.
</commit_message>
<xml_diff>
--- a/Slides/Day2_LoadingTheData.pptx
+++ b/Slides/Day2_LoadingTheData.pptx
@@ -2,7 +2,7 @@
 <file path=ppt/presentation.xml><?xml version="1.0" encoding="utf-8"?>
 <p:presentation xmlns:a="http://schemas.openxmlformats.org/drawingml/2006/main" xmlns:r="http://schemas.openxmlformats.org/officeDocument/2006/relationships" xmlns:p="http://schemas.openxmlformats.org/presentationml/2006/main" saveSubsetFonts="1">
   <p:sldMasterIdLst>
-    <p:sldMasterId id="2147483648" r:id="rId1"/>
+    <p:sldMasterId id="2147483684" r:id="rId1"/>
   </p:sldMasterIdLst>
   <p:notesMasterIdLst>
     <p:notesMasterId r:id="rId16"/>
@@ -29,7 +29,7 @@
     <a:defPPr>
       <a:defRPr lang="en-US"/>
     </a:defPPr>
-    <a:lvl1pPr marL="0" algn="l" defTabSz="914400" rtl="0" eaLnBrk="1" latinLnBrk="0" hangingPunct="1">
+    <a:lvl1pPr marL="0" algn="l" defTabSz="457200" rtl="0" eaLnBrk="1" latinLnBrk="0" hangingPunct="1">
       <a:defRPr sz="1800" kern="1200">
         <a:solidFill>
           <a:schemeClr val="tx1"/>
@@ -39,7 +39,7 @@
         <a:cs typeface="+mn-cs"/>
       </a:defRPr>
     </a:lvl1pPr>
-    <a:lvl2pPr marL="457200" algn="l" defTabSz="914400" rtl="0" eaLnBrk="1" latinLnBrk="0" hangingPunct="1">
+    <a:lvl2pPr marL="457200" algn="l" defTabSz="457200" rtl="0" eaLnBrk="1" latinLnBrk="0" hangingPunct="1">
       <a:defRPr sz="1800" kern="1200">
         <a:solidFill>
           <a:schemeClr val="tx1"/>
@@ -49,7 +49,7 @@
         <a:cs typeface="+mn-cs"/>
       </a:defRPr>
     </a:lvl2pPr>
-    <a:lvl3pPr marL="914400" algn="l" defTabSz="914400" rtl="0" eaLnBrk="1" latinLnBrk="0" hangingPunct="1">
+    <a:lvl3pPr marL="914400" algn="l" defTabSz="457200" rtl="0" eaLnBrk="1" latinLnBrk="0" hangingPunct="1">
       <a:defRPr sz="1800" kern="1200">
         <a:solidFill>
           <a:schemeClr val="tx1"/>
@@ -59,7 +59,7 @@
         <a:cs typeface="+mn-cs"/>
       </a:defRPr>
     </a:lvl3pPr>
-    <a:lvl4pPr marL="1371600" algn="l" defTabSz="914400" rtl="0" eaLnBrk="1" latinLnBrk="0" hangingPunct="1">
+    <a:lvl4pPr marL="1371600" algn="l" defTabSz="457200" rtl="0" eaLnBrk="1" latinLnBrk="0" hangingPunct="1">
       <a:defRPr sz="1800" kern="1200">
         <a:solidFill>
           <a:schemeClr val="tx1"/>
@@ -69,7 +69,7 @@
         <a:cs typeface="+mn-cs"/>
       </a:defRPr>
     </a:lvl4pPr>
-    <a:lvl5pPr marL="1828800" algn="l" defTabSz="914400" rtl="0" eaLnBrk="1" latinLnBrk="0" hangingPunct="1">
+    <a:lvl5pPr marL="1828800" algn="l" defTabSz="457200" rtl="0" eaLnBrk="1" latinLnBrk="0" hangingPunct="1">
       <a:defRPr sz="1800" kern="1200">
         <a:solidFill>
           <a:schemeClr val="tx1"/>
@@ -79,7 +79,7 @@
         <a:cs typeface="+mn-cs"/>
       </a:defRPr>
     </a:lvl5pPr>
-    <a:lvl6pPr marL="2286000" algn="l" defTabSz="914400" rtl="0" eaLnBrk="1" latinLnBrk="0" hangingPunct="1">
+    <a:lvl6pPr marL="2286000" algn="l" defTabSz="457200" rtl="0" eaLnBrk="1" latinLnBrk="0" hangingPunct="1">
       <a:defRPr sz="1800" kern="1200">
         <a:solidFill>
           <a:schemeClr val="tx1"/>
@@ -89,7 +89,7 @@
         <a:cs typeface="+mn-cs"/>
       </a:defRPr>
     </a:lvl6pPr>
-    <a:lvl7pPr marL="2743200" algn="l" defTabSz="914400" rtl="0" eaLnBrk="1" latinLnBrk="0" hangingPunct="1">
+    <a:lvl7pPr marL="2743200" algn="l" defTabSz="457200" rtl="0" eaLnBrk="1" latinLnBrk="0" hangingPunct="1">
       <a:defRPr sz="1800" kern="1200">
         <a:solidFill>
           <a:schemeClr val="tx1"/>
@@ -99,7 +99,7 @@
         <a:cs typeface="+mn-cs"/>
       </a:defRPr>
     </a:lvl7pPr>
-    <a:lvl8pPr marL="3200400" algn="l" defTabSz="914400" rtl="0" eaLnBrk="1" latinLnBrk="0" hangingPunct="1">
+    <a:lvl8pPr marL="3200400" algn="l" defTabSz="457200" rtl="0" eaLnBrk="1" latinLnBrk="0" hangingPunct="1">
       <a:defRPr sz="1800" kern="1200">
         <a:solidFill>
           <a:schemeClr val="tx1"/>
@@ -109,7 +109,7 @@
         <a:cs typeface="+mn-cs"/>
       </a:defRPr>
     </a:lvl8pPr>
-    <a:lvl9pPr marL="3657600" algn="l" defTabSz="914400" rtl="0" eaLnBrk="1" latinLnBrk="0" hangingPunct="1">
+    <a:lvl9pPr marL="3657600" algn="l" defTabSz="457200" rtl="0" eaLnBrk="1" latinLnBrk="0" hangingPunct="1">
       <a:defRPr sz="1800" kern="1200">
         <a:solidFill>
           <a:schemeClr val="tx1"/>
@@ -210,7 +210,7 @@
           <a:p>
             <a:fld id="{6C4C28DC-4C4E-42DF-BF21-4A1381677DBA}" type="datetimeFigureOut">
               <a:rPr lang="en-US" smtClean="0"/>
-              <a:t>7/23/2018</a:t>
+              <a:t>7/24/2018</a:t>
             </a:fld>
             <a:endParaRPr lang="en-US"/>
           </a:p>
@@ -868,6 +868,14 @@
 <file path=ppt/slideLayouts/slideLayout1.xml><?xml version="1.0" encoding="utf-8"?>
 <p:sldLayout xmlns:a="http://schemas.openxmlformats.org/drawingml/2006/main" xmlns:r="http://schemas.openxmlformats.org/officeDocument/2006/relationships" xmlns:p="http://schemas.openxmlformats.org/presentationml/2006/main" type="title" preserve="1">
   <p:cSld name="Title Slide">
+    <p:bg>
+      <p:bgPr>
+        <a:solidFill>
+          <a:schemeClr val="accent1"/>
+        </a:solidFill>
+        <a:effectLst/>
+      </p:bgPr>
+    </p:bg>
     <p:spTree>
       <p:nvGrpSpPr>
         <p:cNvPr id="1" name=""/>
@@ -884,31 +892,69 @@
       </p:grpSpPr>
       <p:sp>
         <p:nvSpPr>
-          <p:cNvPr id="2" name="Title 1">
-            <a:extLst>
-              <a:ext uri="{FF2B5EF4-FFF2-40B4-BE49-F238E27FC236}">
-                <a16:creationId xmlns:a16="http://schemas.microsoft.com/office/drawing/2014/main" id="{ED8C835E-AB2E-43CB-A753-3873D6E2EF94}"/>
-              </a:ext>
-            </a:extLst>
-          </p:cNvPr>
-          <p:cNvSpPr>
-            <a:spLocks noGrp="1"/>
-          </p:cNvSpPr>
-          <p:nvPr>
-            <p:ph type="ctrTitle"/>
-          </p:nvPr>
+          <p:cNvPr id="4" name="Rectangle 3"/>
+          <p:cNvSpPr/>
+          <p:nvPr/>
         </p:nvSpPr>
         <p:spPr>
           <a:xfrm>
-            <a:off x="1524000" y="1122363"/>
-            <a:ext cx="9144000" cy="2387600"/>
+            <a:off x="0" y="0"/>
+            <a:ext cx="12192000" cy="6858000"/>
+          </a:xfrm>
+          <a:prstGeom prst="rect">
+            <a:avLst/>
+          </a:prstGeom>
+          <a:ln>
+            <a:noFill/>
+          </a:ln>
+        </p:spPr>
+        <p:style>
+          <a:lnRef idx="2">
+            <a:schemeClr val="accent1">
+              <a:shade val="50000"/>
+            </a:schemeClr>
+          </a:lnRef>
+          <a:fillRef idx="1">
+            <a:schemeClr val="accent1"/>
+          </a:fillRef>
+          <a:effectRef idx="0">
+            <a:schemeClr val="accent1"/>
+          </a:effectRef>
+          <a:fontRef idx="minor">
+            <a:schemeClr val="lt1"/>
+          </a:fontRef>
+        </p:style>
+      </p:sp>
+      <p:sp>
+        <p:nvSpPr>
+          <p:cNvPr id="2" name="Title 1"/>
+          <p:cNvSpPr>
+            <a:spLocks noGrp="1"/>
+          </p:cNvSpPr>
+          <p:nvPr>
+            <p:ph type="ctrTitle"/>
+          </p:nvPr>
+        </p:nvSpPr>
+        <p:spPr>
+          <a:xfrm>
+            <a:off x="603504" y="770467"/>
+            <a:ext cx="10782300" cy="3352800"/>
           </a:xfrm>
         </p:spPr>
         <p:txBody>
-          <a:bodyPr anchor="b"/>
+          <a:bodyPr anchor="b">
+            <a:noAutofit/>
+          </a:bodyPr>
           <a:lstStyle>
-            <a:lvl1pPr algn="ctr">
-              <a:defRPr sz="6000"/>
+            <a:lvl1pPr algn="l">
+              <a:lnSpc>
+                <a:spcPct val="80000"/>
+              </a:lnSpc>
+              <a:defRPr sz="8800" spc="-120" baseline="0">
+                <a:solidFill>
+                  <a:srgbClr val="FFFFFF"/>
+                </a:solidFill>
+              </a:defRPr>
             </a:lvl1pPr>
           </a:lstStyle>
           <a:p>
@@ -916,18 +962,13 @@
               <a:rPr lang="en-US"/>
               <a:t>Click to edit Master title style</a:t>
             </a:r>
-          </a:p>
-        </p:txBody>
-      </p:sp>
-      <p:sp>
-        <p:nvSpPr>
-          <p:cNvPr id="3" name="Subtitle 2">
-            <a:extLst>
-              <a:ext uri="{FF2B5EF4-FFF2-40B4-BE49-F238E27FC236}">
-                <a16:creationId xmlns:a16="http://schemas.microsoft.com/office/drawing/2014/main" id="{015CA517-27D1-4023-B0C8-C1887450BA1A}"/>
-              </a:ext>
-            </a:extLst>
-          </p:cNvPr>
+            <a:endParaRPr lang="en-US" dirty="0"/>
+          </a:p>
+        </p:txBody>
+      </p:sp>
+      <p:sp>
+        <p:nvSpPr>
+          <p:cNvPr id="3" name="Subtitle 2"/>
           <p:cNvSpPr>
             <a:spLocks noGrp="1"/>
           </p:cNvSpPr>
@@ -937,48 +978,55 @@
         </p:nvSpPr>
         <p:spPr>
           <a:xfrm>
-            <a:off x="1524000" y="3602038"/>
-            <a:ext cx="9144000" cy="1655762"/>
+            <a:off x="667512" y="4206876"/>
+            <a:ext cx="9228201" cy="1645920"/>
           </a:xfrm>
         </p:spPr>
         <p:txBody>
-          <a:bodyPr/>
+          <a:bodyPr>
+            <a:normAutofit/>
+          </a:bodyPr>
           <a:lstStyle>
-            <a:lvl1pPr marL="0" indent="0" algn="ctr">
-              <a:buNone/>
-              <a:defRPr sz="2400"/>
+            <a:lvl1pPr marL="0" indent="0" algn="l">
+              <a:buNone/>
+              <a:defRPr sz="3200">
+                <a:solidFill>
+                  <a:schemeClr val="bg1"/>
+                </a:solidFill>
+                <a:latin typeface="+mj-lt"/>
+              </a:defRPr>
             </a:lvl1pPr>
             <a:lvl2pPr marL="457200" indent="0" algn="ctr">
               <a:buNone/>
-              <a:defRPr sz="2000"/>
+              <a:defRPr sz="2800"/>
             </a:lvl2pPr>
             <a:lvl3pPr marL="914400" indent="0" algn="ctr">
               <a:buNone/>
-              <a:defRPr sz="1800"/>
+              <a:defRPr sz="2400"/>
             </a:lvl3pPr>
             <a:lvl4pPr marL="1371600" indent="0" algn="ctr">
               <a:buNone/>
-              <a:defRPr sz="1600"/>
+              <a:defRPr sz="2000"/>
             </a:lvl4pPr>
             <a:lvl5pPr marL="1828800" indent="0" algn="ctr">
               <a:buNone/>
-              <a:defRPr sz="1600"/>
+              <a:defRPr sz="2000"/>
             </a:lvl5pPr>
             <a:lvl6pPr marL="2286000" indent="0" algn="ctr">
               <a:buNone/>
-              <a:defRPr sz="1600"/>
+              <a:defRPr sz="2000"/>
             </a:lvl6pPr>
             <a:lvl7pPr marL="2743200" indent="0" algn="ctr">
               <a:buNone/>
-              <a:defRPr sz="1600"/>
+              <a:defRPr sz="2000"/>
             </a:lvl7pPr>
             <a:lvl8pPr marL="3200400" indent="0" algn="ctr">
               <a:buNone/>
-              <a:defRPr sz="1600"/>
+              <a:defRPr sz="2000"/>
             </a:lvl8pPr>
             <a:lvl9pPr marL="3657600" indent="0" algn="ctr">
               <a:buNone/>
-              <a:defRPr sz="1600"/>
+              <a:defRPr sz="2000"/>
             </a:lvl9pPr>
           </a:lstStyle>
           <a:p>
@@ -986,18 +1034,13 @@
               <a:rPr lang="en-US"/>
               <a:t>Click to edit Master subtitle style</a:t>
             </a:r>
-          </a:p>
-        </p:txBody>
-      </p:sp>
-      <p:sp>
-        <p:nvSpPr>
-          <p:cNvPr id="4" name="Date Placeholder 3">
-            <a:extLst>
-              <a:ext uri="{FF2B5EF4-FFF2-40B4-BE49-F238E27FC236}">
-                <a16:creationId xmlns:a16="http://schemas.microsoft.com/office/drawing/2014/main" id="{A60A574C-E305-44AC-B690-1D93D76DC501}"/>
-              </a:ext>
-            </a:extLst>
-          </p:cNvPr>
+            <a:endParaRPr lang="en-US" dirty="0"/>
+          </a:p>
+        </p:txBody>
+      </p:sp>
+      <p:sp>
+        <p:nvSpPr>
+          <p:cNvPr id="7" name="Date Placeholder 6"/>
           <p:cNvSpPr>
             <a:spLocks noGrp="1"/>
           </p:cNvSpPr>
@@ -1008,11 +1051,21 @@
         <p:spPr/>
         <p:txBody>
           <a:bodyPr/>
-          <a:lstStyle/>
+          <a:lstStyle>
+            <a:lvl1pPr>
+              <a:defRPr>
+                <a:solidFill>
+                  <a:srgbClr val="FFFFFF">
+                    <a:alpha val="80000"/>
+                  </a:srgbClr>
+                </a:solidFill>
+              </a:defRPr>
+            </a:lvl1pPr>
+          </a:lstStyle>
           <a:p>
             <a:fld id="{E9DC5737-47CD-4AF9-B0DD-D5F5337877F4}" type="datetimeFigureOut">
               <a:rPr lang="en-US" smtClean="0"/>
-              <a:t>7/23/2018</a:t>
+              <a:t>7/24/2018</a:t>
             </a:fld>
             <a:endParaRPr lang="en-US"/>
           </a:p>
@@ -1020,13 +1073,7 @@
       </p:sp>
       <p:sp>
         <p:nvSpPr>
-          <p:cNvPr id="5" name="Footer Placeholder 4">
-            <a:extLst>
-              <a:ext uri="{FF2B5EF4-FFF2-40B4-BE49-F238E27FC236}">
-                <a16:creationId xmlns:a16="http://schemas.microsoft.com/office/drawing/2014/main" id="{97E0BE48-E008-482B-A053-8DB2B072DE6D}"/>
-              </a:ext>
-            </a:extLst>
-          </p:cNvPr>
+          <p:cNvPr id="8" name="Footer Placeholder 7"/>
           <p:cNvSpPr>
             <a:spLocks noGrp="1"/>
           </p:cNvSpPr>
@@ -1037,7 +1084,17 @@
         <p:spPr/>
         <p:txBody>
           <a:bodyPr/>
-          <a:lstStyle/>
+          <a:lstStyle>
+            <a:lvl1pPr>
+              <a:defRPr>
+                <a:solidFill>
+                  <a:srgbClr val="FFFFFF">
+                    <a:alpha val="80000"/>
+                  </a:srgbClr>
+                </a:solidFill>
+              </a:defRPr>
+            </a:lvl1pPr>
+          </a:lstStyle>
           <a:p>
             <a:endParaRPr lang="en-US"/>
           </a:p>
@@ -1045,13 +1102,7 @@
       </p:sp>
       <p:sp>
         <p:nvSpPr>
-          <p:cNvPr id="6" name="Slide Number Placeholder 5">
-            <a:extLst>
-              <a:ext uri="{FF2B5EF4-FFF2-40B4-BE49-F238E27FC236}">
-                <a16:creationId xmlns:a16="http://schemas.microsoft.com/office/drawing/2014/main" id="{D777E3F3-B541-476E-B65D-33ED171066B8}"/>
-              </a:ext>
-            </a:extLst>
-          </p:cNvPr>
+          <p:cNvPr id="9" name="Slide Number Placeholder 8"/>
           <p:cNvSpPr>
             <a:spLocks noGrp="1"/>
           </p:cNvSpPr>
@@ -1062,7 +1113,17 @@
         <p:spPr/>
         <p:txBody>
           <a:bodyPr/>
-          <a:lstStyle/>
+          <a:lstStyle>
+            <a:lvl1pPr>
+              <a:defRPr>
+                <a:solidFill>
+                  <a:srgbClr val="FFFFFF">
+                    <a:alpha val="25000"/>
+                  </a:srgbClr>
+                </a:solidFill>
+              </a:defRPr>
+            </a:lvl1pPr>
+          </a:lstStyle>
           <a:p>
             <a:fld id="{1ED8BE74-FB5D-43C5-8CAD-F66A36645EE8}" type="slidenum">
               <a:rPr lang="en-US" smtClean="0"/>
@@ -1075,7 +1136,7 @@
     </p:spTree>
     <p:extLst>
       <p:ext uri="{BB962C8B-B14F-4D97-AF65-F5344CB8AC3E}">
-        <p14:creationId xmlns:p14="http://schemas.microsoft.com/office/powerpoint/2010/main" val="2641461071"/>
+        <p14:creationId xmlns:p14="http://schemas.microsoft.com/office/powerpoint/2010/main" val="34288993"/>
       </p:ext>
     </p:extLst>
   </p:cSld>
@@ -1104,13 +1165,7 @@
       </p:grpSpPr>
       <p:sp>
         <p:nvSpPr>
-          <p:cNvPr id="2" name="Title 1">
-            <a:extLst>
-              <a:ext uri="{FF2B5EF4-FFF2-40B4-BE49-F238E27FC236}">
-                <a16:creationId xmlns:a16="http://schemas.microsoft.com/office/drawing/2014/main" id="{B50D8570-6078-452A-B0FC-9E5617B0103D}"/>
-              </a:ext>
-            </a:extLst>
-          </p:cNvPr>
+          <p:cNvPr id="2" name="Title 1"/>
           <p:cNvSpPr>
             <a:spLocks noGrp="1"/>
           </p:cNvSpPr>
@@ -1127,18 +1182,13 @@
               <a:rPr lang="en-US"/>
               <a:t>Click to edit Master title style</a:t>
             </a:r>
-          </a:p>
-        </p:txBody>
-      </p:sp>
-      <p:sp>
-        <p:nvSpPr>
-          <p:cNvPr id="3" name="Vertical Text Placeholder 2">
-            <a:extLst>
-              <a:ext uri="{FF2B5EF4-FFF2-40B4-BE49-F238E27FC236}">
-                <a16:creationId xmlns:a16="http://schemas.microsoft.com/office/drawing/2014/main" id="{E8675989-7E6B-4F60-A4FE-214AFCD607E2}"/>
-              </a:ext>
-            </a:extLst>
-          </p:cNvPr>
+            <a:endParaRPr lang="en-US" dirty="0"/>
+          </a:p>
+        </p:txBody>
+      </p:sp>
+      <p:sp>
+        <p:nvSpPr>
+          <p:cNvPr id="3" name="Vertical Text Placeholder 2"/>
           <p:cNvSpPr>
             <a:spLocks noGrp="1"/>
           </p:cNvSpPr>
@@ -1184,18 +1234,13 @@
               <a:rPr lang="en-US"/>
               <a:t>Fifth level</a:t>
             </a:r>
-          </a:p>
-        </p:txBody>
-      </p:sp>
-      <p:sp>
-        <p:nvSpPr>
-          <p:cNvPr id="4" name="Date Placeholder 3">
-            <a:extLst>
-              <a:ext uri="{FF2B5EF4-FFF2-40B4-BE49-F238E27FC236}">
-                <a16:creationId xmlns:a16="http://schemas.microsoft.com/office/drawing/2014/main" id="{33DC1C43-ACAE-492A-8CC7-10B447BD6B67}"/>
-              </a:ext>
-            </a:extLst>
-          </p:cNvPr>
+            <a:endParaRPr lang="en-US" dirty="0"/>
+          </a:p>
+        </p:txBody>
+      </p:sp>
+      <p:sp>
+        <p:nvSpPr>
+          <p:cNvPr id="4" name="Date Placeholder 3"/>
           <p:cNvSpPr>
             <a:spLocks noGrp="1"/>
           </p:cNvSpPr>
@@ -1210,7 +1255,7 @@
           <a:p>
             <a:fld id="{E9DC5737-47CD-4AF9-B0DD-D5F5337877F4}" type="datetimeFigureOut">
               <a:rPr lang="en-US" smtClean="0"/>
-              <a:t>7/23/2018</a:t>
+              <a:t>7/24/2018</a:t>
             </a:fld>
             <a:endParaRPr lang="en-US"/>
           </a:p>
@@ -1218,13 +1263,7 @@
       </p:sp>
       <p:sp>
         <p:nvSpPr>
-          <p:cNvPr id="5" name="Footer Placeholder 4">
-            <a:extLst>
-              <a:ext uri="{FF2B5EF4-FFF2-40B4-BE49-F238E27FC236}">
-                <a16:creationId xmlns:a16="http://schemas.microsoft.com/office/drawing/2014/main" id="{319C3A1C-FC19-4FB2-8E9C-DA492C6BF91E}"/>
-              </a:ext>
-            </a:extLst>
-          </p:cNvPr>
+          <p:cNvPr id="5" name="Footer Placeholder 4"/>
           <p:cNvSpPr>
             <a:spLocks noGrp="1"/>
           </p:cNvSpPr>
@@ -1243,13 +1282,7 @@
       </p:sp>
       <p:sp>
         <p:nvSpPr>
-          <p:cNvPr id="6" name="Slide Number Placeholder 5">
-            <a:extLst>
-              <a:ext uri="{FF2B5EF4-FFF2-40B4-BE49-F238E27FC236}">
-                <a16:creationId xmlns:a16="http://schemas.microsoft.com/office/drawing/2014/main" id="{C2112F11-A3C0-4123-A2C0-A26C54723C89}"/>
-              </a:ext>
-            </a:extLst>
-          </p:cNvPr>
+          <p:cNvPr id="6" name="Slide Number Placeholder 5"/>
           <p:cNvSpPr>
             <a:spLocks noGrp="1"/>
           </p:cNvSpPr>
@@ -1273,7 +1306,7 @@
     </p:spTree>
     <p:extLst>
       <p:ext uri="{BB962C8B-B14F-4D97-AF65-F5344CB8AC3E}">
-        <p14:creationId xmlns:p14="http://schemas.microsoft.com/office/powerpoint/2010/main" val="682045653"/>
+        <p14:creationId xmlns:p14="http://schemas.microsoft.com/office/powerpoint/2010/main" val="926674490"/>
       </p:ext>
     </p:extLst>
   </p:cSld>
@@ -1302,13 +1335,7 @@
       </p:grpSpPr>
       <p:sp>
         <p:nvSpPr>
-          <p:cNvPr id="2" name="Vertical Title 1">
-            <a:extLst>
-              <a:ext uri="{FF2B5EF4-FFF2-40B4-BE49-F238E27FC236}">
-                <a16:creationId xmlns:a16="http://schemas.microsoft.com/office/drawing/2014/main" id="{06CDDD98-5DC4-4663-982C-CF061EAFF433}"/>
-              </a:ext>
-            </a:extLst>
-          </p:cNvPr>
+          <p:cNvPr id="2" name="Vertical Title 1"/>
           <p:cNvSpPr>
             <a:spLocks noGrp="1"/>
           </p:cNvSpPr>
@@ -1318,8 +1345,8 @@
         </p:nvSpPr>
         <p:spPr>
           <a:xfrm>
-            <a:off x="8724900" y="365125"/>
-            <a:ext cx="2628900" cy="5811838"/>
+            <a:off x="8743950" y="695325"/>
+            <a:ext cx="2628900" cy="4800600"/>
           </a:xfrm>
         </p:spPr>
         <p:txBody>
@@ -1330,18 +1357,13 @@
               <a:rPr lang="en-US"/>
               <a:t>Click to edit Master title style</a:t>
             </a:r>
-          </a:p>
-        </p:txBody>
-      </p:sp>
-      <p:sp>
-        <p:nvSpPr>
-          <p:cNvPr id="3" name="Vertical Text Placeholder 2">
-            <a:extLst>
-              <a:ext uri="{FF2B5EF4-FFF2-40B4-BE49-F238E27FC236}">
-                <a16:creationId xmlns:a16="http://schemas.microsoft.com/office/drawing/2014/main" id="{4C20BE4C-82DC-4BAF-BDDD-C589217F40B7}"/>
-              </a:ext>
-            </a:extLst>
-          </p:cNvPr>
+            <a:endParaRPr lang="en-US" dirty="0"/>
+          </a:p>
+        </p:txBody>
+      </p:sp>
+      <p:sp>
+        <p:nvSpPr>
+          <p:cNvPr id="3" name="Vertical Text Placeholder 2"/>
           <p:cNvSpPr>
             <a:spLocks noGrp="1"/>
           </p:cNvSpPr>
@@ -1351,8 +1373,8 @@
         </p:nvSpPr>
         <p:spPr>
           <a:xfrm>
-            <a:off x="838200" y="365125"/>
-            <a:ext cx="7734300" cy="5811838"/>
+            <a:off x="771525" y="714375"/>
+            <a:ext cx="7734300" cy="5400675"/>
           </a:xfrm>
         </p:spPr>
         <p:txBody>
@@ -1392,18 +1414,13 @@
               <a:rPr lang="en-US"/>
               <a:t>Fifth level</a:t>
             </a:r>
-          </a:p>
-        </p:txBody>
-      </p:sp>
-      <p:sp>
-        <p:nvSpPr>
-          <p:cNvPr id="4" name="Date Placeholder 3">
-            <a:extLst>
-              <a:ext uri="{FF2B5EF4-FFF2-40B4-BE49-F238E27FC236}">
-                <a16:creationId xmlns:a16="http://schemas.microsoft.com/office/drawing/2014/main" id="{8F6EAEF0-FB2C-453D-8597-ADB83E889122}"/>
-              </a:ext>
-            </a:extLst>
-          </p:cNvPr>
+            <a:endParaRPr lang="en-US" dirty="0"/>
+          </a:p>
+        </p:txBody>
+      </p:sp>
+      <p:sp>
+        <p:nvSpPr>
+          <p:cNvPr id="4" name="Date Placeholder 3"/>
           <p:cNvSpPr>
             <a:spLocks noGrp="1"/>
           </p:cNvSpPr>
@@ -1418,7 +1435,7 @@
           <a:p>
             <a:fld id="{E9DC5737-47CD-4AF9-B0DD-D5F5337877F4}" type="datetimeFigureOut">
               <a:rPr lang="en-US" smtClean="0"/>
-              <a:t>7/23/2018</a:t>
+              <a:t>7/24/2018</a:t>
             </a:fld>
             <a:endParaRPr lang="en-US"/>
           </a:p>
@@ -1426,13 +1443,7 @@
       </p:sp>
       <p:sp>
         <p:nvSpPr>
-          <p:cNvPr id="5" name="Footer Placeholder 4">
-            <a:extLst>
-              <a:ext uri="{FF2B5EF4-FFF2-40B4-BE49-F238E27FC236}">
-                <a16:creationId xmlns:a16="http://schemas.microsoft.com/office/drawing/2014/main" id="{E36E1B8D-9F49-4CA8-90BA-95D0B8C6B944}"/>
-              </a:ext>
-            </a:extLst>
-          </p:cNvPr>
+          <p:cNvPr id="5" name="Footer Placeholder 4"/>
           <p:cNvSpPr>
             <a:spLocks noGrp="1"/>
           </p:cNvSpPr>
@@ -1451,13 +1462,7 @@
       </p:sp>
       <p:sp>
         <p:nvSpPr>
-          <p:cNvPr id="6" name="Slide Number Placeholder 5">
-            <a:extLst>
-              <a:ext uri="{FF2B5EF4-FFF2-40B4-BE49-F238E27FC236}">
-                <a16:creationId xmlns:a16="http://schemas.microsoft.com/office/drawing/2014/main" id="{BBA1B641-5004-44D4-B558-E10A3845C448}"/>
-              </a:ext>
-            </a:extLst>
-          </p:cNvPr>
+          <p:cNvPr id="6" name="Slide Number Placeholder 5"/>
           <p:cNvSpPr>
             <a:spLocks noGrp="1"/>
           </p:cNvSpPr>
@@ -1481,7 +1486,7 @@
     </p:spTree>
     <p:extLst>
       <p:ext uri="{BB962C8B-B14F-4D97-AF65-F5344CB8AC3E}">
-        <p14:creationId xmlns:p14="http://schemas.microsoft.com/office/powerpoint/2010/main" val="2938297440"/>
+        <p14:creationId xmlns:p14="http://schemas.microsoft.com/office/powerpoint/2010/main" val="1340145657"/>
       </p:ext>
     </p:extLst>
   </p:cSld>
@@ -1510,13 +1515,7 @@
       </p:grpSpPr>
       <p:sp>
         <p:nvSpPr>
-          <p:cNvPr id="2" name="Title 1">
-            <a:extLst>
-              <a:ext uri="{FF2B5EF4-FFF2-40B4-BE49-F238E27FC236}">
-                <a16:creationId xmlns:a16="http://schemas.microsoft.com/office/drawing/2014/main" id="{BA23B7CF-70EE-43F8-8252-6D9D2C3A856E}"/>
-              </a:ext>
-            </a:extLst>
-          </p:cNvPr>
+          <p:cNvPr id="2" name="Title 1"/>
           <p:cNvSpPr>
             <a:spLocks noGrp="1"/>
           </p:cNvSpPr>
@@ -1533,18 +1532,13 @@
               <a:rPr lang="en-US"/>
               <a:t>Click to edit Master title style</a:t>
             </a:r>
-          </a:p>
-        </p:txBody>
-      </p:sp>
-      <p:sp>
-        <p:nvSpPr>
-          <p:cNvPr id="3" name="Content Placeholder 2">
-            <a:extLst>
-              <a:ext uri="{FF2B5EF4-FFF2-40B4-BE49-F238E27FC236}">
-                <a16:creationId xmlns:a16="http://schemas.microsoft.com/office/drawing/2014/main" id="{0413AF58-1E69-4916-9D3F-010FB8001446}"/>
-              </a:ext>
-            </a:extLst>
-          </p:cNvPr>
+            <a:endParaRPr lang="en-US" dirty="0"/>
+          </a:p>
+        </p:txBody>
+      </p:sp>
+      <p:sp>
+        <p:nvSpPr>
+          <p:cNvPr id="3" name="Content Placeholder 2"/>
           <p:cNvSpPr>
             <a:spLocks noGrp="1"/>
           </p:cNvSpPr>
@@ -1590,18 +1584,13 @@
               <a:rPr lang="en-US"/>
               <a:t>Fifth level</a:t>
             </a:r>
-          </a:p>
-        </p:txBody>
-      </p:sp>
-      <p:sp>
-        <p:nvSpPr>
-          <p:cNvPr id="4" name="Date Placeholder 3">
-            <a:extLst>
-              <a:ext uri="{FF2B5EF4-FFF2-40B4-BE49-F238E27FC236}">
-                <a16:creationId xmlns:a16="http://schemas.microsoft.com/office/drawing/2014/main" id="{D70A2967-D897-4F13-AD01-B70E6A0AAC7C}"/>
-              </a:ext>
-            </a:extLst>
-          </p:cNvPr>
+            <a:endParaRPr lang="en-US" dirty="0"/>
+          </a:p>
+        </p:txBody>
+      </p:sp>
+      <p:sp>
+        <p:nvSpPr>
+          <p:cNvPr id="4" name="Date Placeholder 3"/>
           <p:cNvSpPr>
             <a:spLocks noGrp="1"/>
           </p:cNvSpPr>
@@ -1616,7 +1605,7 @@
           <a:p>
             <a:fld id="{E9DC5737-47CD-4AF9-B0DD-D5F5337877F4}" type="datetimeFigureOut">
               <a:rPr lang="en-US" smtClean="0"/>
-              <a:t>7/23/2018</a:t>
+              <a:t>7/24/2018</a:t>
             </a:fld>
             <a:endParaRPr lang="en-US"/>
           </a:p>
@@ -1624,13 +1613,7 @@
       </p:sp>
       <p:sp>
         <p:nvSpPr>
-          <p:cNvPr id="5" name="Footer Placeholder 4">
-            <a:extLst>
-              <a:ext uri="{FF2B5EF4-FFF2-40B4-BE49-F238E27FC236}">
-                <a16:creationId xmlns:a16="http://schemas.microsoft.com/office/drawing/2014/main" id="{DFF8D27E-3A3D-4E58-8F4B-DFCD84672D8A}"/>
-              </a:ext>
-            </a:extLst>
-          </p:cNvPr>
+          <p:cNvPr id="5" name="Footer Placeholder 4"/>
           <p:cNvSpPr>
             <a:spLocks noGrp="1"/>
           </p:cNvSpPr>
@@ -1649,13 +1632,7 @@
       </p:sp>
       <p:sp>
         <p:nvSpPr>
-          <p:cNvPr id="6" name="Slide Number Placeholder 5">
-            <a:extLst>
-              <a:ext uri="{FF2B5EF4-FFF2-40B4-BE49-F238E27FC236}">
-                <a16:creationId xmlns:a16="http://schemas.microsoft.com/office/drawing/2014/main" id="{EF56262F-77E8-4E4D-AD98-588B5FDC01E7}"/>
-              </a:ext>
-            </a:extLst>
-          </p:cNvPr>
+          <p:cNvPr id="6" name="Slide Number Placeholder 5"/>
           <p:cNvSpPr>
             <a:spLocks noGrp="1"/>
           </p:cNvSpPr>
@@ -1679,7 +1656,7 @@
     </p:spTree>
     <p:extLst>
       <p:ext uri="{BB962C8B-B14F-4D97-AF65-F5344CB8AC3E}">
-        <p14:creationId xmlns:p14="http://schemas.microsoft.com/office/powerpoint/2010/main" val="2250753972"/>
+        <p14:creationId xmlns:p14="http://schemas.microsoft.com/office/powerpoint/2010/main" val="1572941712"/>
       </p:ext>
     </p:extLst>
   </p:cSld>
@@ -1708,13 +1685,7 @@
       </p:grpSpPr>
       <p:sp>
         <p:nvSpPr>
-          <p:cNvPr id="2" name="Title 1">
-            <a:extLst>
-              <a:ext uri="{FF2B5EF4-FFF2-40B4-BE49-F238E27FC236}">
-                <a16:creationId xmlns:a16="http://schemas.microsoft.com/office/drawing/2014/main" id="{6635E008-55B5-4D30-921F-42131CFEC98E}"/>
-              </a:ext>
-            </a:extLst>
-          </p:cNvPr>
+          <p:cNvPr id="2" name="Title 1"/>
           <p:cNvSpPr>
             <a:spLocks noGrp="1"/>
           </p:cNvSpPr>
@@ -1724,63 +1695,68 @@
         </p:nvSpPr>
         <p:spPr>
           <a:xfrm>
-            <a:off x="831850" y="1709738"/>
-            <a:ext cx="10515600" cy="2852737"/>
+            <a:off x="603504" y="767419"/>
+            <a:ext cx="10780776" cy="3355848"/>
           </a:xfrm>
         </p:spPr>
         <p:txBody>
-          <a:bodyPr anchor="b"/>
+          <a:bodyPr anchor="b">
+            <a:normAutofit/>
+          </a:bodyPr>
           <a:lstStyle>
             <a:lvl1pPr>
-              <a:defRPr sz="6000"/>
-            </a:lvl1pPr>
-          </a:lstStyle>
-          <a:p>
-            <a:r>
-              <a:rPr lang="en-US"/>
-              <a:t>Click to edit Master title style</a:t>
-            </a:r>
-          </a:p>
-        </p:txBody>
-      </p:sp>
-      <p:sp>
-        <p:nvSpPr>
-          <p:cNvPr id="3" name="Text Placeholder 2">
-            <a:extLst>
-              <a:ext uri="{FF2B5EF4-FFF2-40B4-BE49-F238E27FC236}">
-                <a16:creationId xmlns:a16="http://schemas.microsoft.com/office/drawing/2014/main" id="{B152D9D1-D4F8-434F-A5F9-836F8142903A}"/>
-              </a:ext>
-            </a:extLst>
-          </p:cNvPr>
-          <p:cNvSpPr>
-            <a:spLocks noGrp="1"/>
-          </p:cNvSpPr>
-          <p:nvPr>
-            <p:ph type="body" idx="1"/>
-          </p:nvPr>
-        </p:nvSpPr>
-        <p:spPr>
-          <a:xfrm>
-            <a:off x="831850" y="4589463"/>
-            <a:ext cx="10515600" cy="1500187"/>
-          </a:xfrm>
-        </p:spPr>
-        <p:txBody>
-          <a:bodyPr/>
-          <a:lstStyle>
-            <a:lvl1pPr marL="0" indent="0">
-              <a:buNone/>
-              <a:defRPr sz="2400">
+              <a:lnSpc>
+                <a:spcPct val="80000"/>
+              </a:lnSpc>
+              <a:defRPr sz="8800" b="0" baseline="0">
                 <a:solidFill>
-                  <a:schemeClr val="tx1">
-                    <a:tint val="75000"/>
-                  </a:schemeClr>
+                  <a:schemeClr val="accent1"/>
                 </a:solidFill>
               </a:defRPr>
             </a:lvl1pPr>
+          </a:lstStyle>
+          <a:p>
+            <a:r>
+              <a:rPr lang="en-US"/>
+              <a:t>Click to edit Master title style</a:t>
+            </a:r>
+            <a:endParaRPr lang="en-US" dirty="0"/>
+          </a:p>
+        </p:txBody>
+      </p:sp>
+      <p:sp>
+        <p:nvSpPr>
+          <p:cNvPr id="3" name="Text Placeholder 2"/>
+          <p:cNvSpPr>
+            <a:spLocks noGrp="1"/>
+          </p:cNvSpPr>
+          <p:nvPr>
+            <p:ph type="body" idx="1"/>
+          </p:nvPr>
+        </p:nvSpPr>
+        <p:spPr>
+          <a:xfrm>
+            <a:off x="667512" y="4204209"/>
+            <a:ext cx="9226296" cy="1645920"/>
+          </a:xfrm>
+        </p:spPr>
+        <p:txBody>
+          <a:bodyPr anchor="t">
+            <a:normAutofit/>
+          </a:bodyPr>
+          <a:lstStyle>
+            <a:lvl1pPr marL="0" indent="0">
+              <a:buNone/>
+              <a:defRPr sz="3200">
+                <a:solidFill>
+                  <a:schemeClr val="tx1"/>
+                </a:solidFill>
+                <a:latin typeface="+mj-lt"/>
+              </a:defRPr>
+            </a:lvl1pPr>
             <a:lvl2pPr marL="457200" indent="0">
               <a:buNone/>
-              <a:defRPr sz="2000">
+              <a:defRPr sz="1800">
                 <a:solidFill>
                   <a:schemeClr val="tx1">
                     <a:tint val="75000"/>
@@ -1790,7 +1766,7 @@
             </a:lvl2pPr>
             <a:lvl3pPr marL="914400" indent="0">
               <a:buNone/>
-              <a:defRPr sz="1800">
+              <a:defRPr sz="1600">
                 <a:solidFill>
                   <a:schemeClr val="tx1">
                     <a:tint val="75000"/>
@@ -1800,7 +1776,7 @@
             </a:lvl3pPr>
             <a:lvl4pPr marL="1371600" indent="0">
               <a:buNone/>
-              <a:defRPr sz="1600">
+              <a:defRPr sz="1400">
                 <a:solidFill>
                   <a:schemeClr val="tx1">
                     <a:tint val="75000"/>
@@ -1810,7 +1786,7 @@
             </a:lvl4pPr>
             <a:lvl5pPr marL="1828800" indent="0">
               <a:buNone/>
-              <a:defRPr sz="1600">
+              <a:defRPr sz="1400">
                 <a:solidFill>
                   <a:schemeClr val="tx1">
                     <a:tint val="75000"/>
@@ -1820,7 +1796,7 @@
             </a:lvl5pPr>
             <a:lvl6pPr marL="2286000" indent="0">
               <a:buNone/>
-              <a:defRPr sz="1600">
+              <a:defRPr sz="1400">
                 <a:solidFill>
                   <a:schemeClr val="tx1">
                     <a:tint val="75000"/>
@@ -1830,7 +1806,7 @@
             </a:lvl6pPr>
             <a:lvl7pPr marL="2743200" indent="0">
               <a:buNone/>
-              <a:defRPr sz="1600">
+              <a:defRPr sz="1400">
                 <a:solidFill>
                   <a:schemeClr val="tx1">
                     <a:tint val="75000"/>
@@ -1840,7 +1816,7 @@
             </a:lvl7pPr>
             <a:lvl8pPr marL="3200400" indent="0">
               <a:buNone/>
-              <a:defRPr sz="1600">
+              <a:defRPr sz="1400">
                 <a:solidFill>
                   <a:schemeClr val="tx1">
                     <a:tint val="75000"/>
@@ -1850,7 +1826,7 @@
             </a:lvl8pPr>
             <a:lvl9pPr marL="3657600" indent="0">
               <a:buNone/>
-              <a:defRPr sz="1600">
+              <a:defRPr sz="1400">
                 <a:solidFill>
                   <a:schemeClr val="tx1">
                     <a:tint val="75000"/>
@@ -1870,13 +1846,7 @@
       </p:sp>
       <p:sp>
         <p:nvSpPr>
-          <p:cNvPr id="4" name="Date Placeholder 3">
-            <a:extLst>
-              <a:ext uri="{FF2B5EF4-FFF2-40B4-BE49-F238E27FC236}">
-                <a16:creationId xmlns:a16="http://schemas.microsoft.com/office/drawing/2014/main" id="{086C3D8E-D154-4FBC-9211-857E827F6CA7}"/>
-              </a:ext>
-            </a:extLst>
-          </p:cNvPr>
+          <p:cNvPr id="4" name="Date Placeholder 3"/>
           <p:cNvSpPr>
             <a:spLocks noGrp="1"/>
           </p:cNvSpPr>
@@ -1891,7 +1861,7 @@
           <a:p>
             <a:fld id="{E9DC5737-47CD-4AF9-B0DD-D5F5337877F4}" type="datetimeFigureOut">
               <a:rPr lang="en-US" smtClean="0"/>
-              <a:t>7/23/2018</a:t>
+              <a:t>7/24/2018</a:t>
             </a:fld>
             <a:endParaRPr lang="en-US"/>
           </a:p>
@@ -1899,13 +1869,7 @@
       </p:sp>
       <p:sp>
         <p:nvSpPr>
-          <p:cNvPr id="5" name="Footer Placeholder 4">
-            <a:extLst>
-              <a:ext uri="{FF2B5EF4-FFF2-40B4-BE49-F238E27FC236}">
-                <a16:creationId xmlns:a16="http://schemas.microsoft.com/office/drawing/2014/main" id="{9BDC51B1-E22B-4110-99AD-1845689488CD}"/>
-              </a:ext>
-            </a:extLst>
-          </p:cNvPr>
+          <p:cNvPr id="5" name="Footer Placeholder 4"/>
           <p:cNvSpPr>
             <a:spLocks noGrp="1"/>
           </p:cNvSpPr>
@@ -1924,13 +1888,7 @@
       </p:sp>
       <p:sp>
         <p:nvSpPr>
-          <p:cNvPr id="6" name="Slide Number Placeholder 5">
-            <a:extLst>
-              <a:ext uri="{FF2B5EF4-FFF2-40B4-BE49-F238E27FC236}">
-                <a16:creationId xmlns:a16="http://schemas.microsoft.com/office/drawing/2014/main" id="{5F33D9E8-95F6-4E86-B409-F6F579D60A01}"/>
-              </a:ext>
-            </a:extLst>
-          </p:cNvPr>
+          <p:cNvPr id="6" name="Slide Number Placeholder 5"/>
           <p:cNvSpPr>
             <a:spLocks noGrp="1"/>
           </p:cNvSpPr>
@@ -1954,7 +1912,7 @@
     </p:spTree>
     <p:extLst>
       <p:ext uri="{BB962C8B-B14F-4D97-AF65-F5344CB8AC3E}">
-        <p14:creationId xmlns:p14="http://schemas.microsoft.com/office/powerpoint/2010/main" val="3734985808"/>
+        <p14:creationId xmlns:p14="http://schemas.microsoft.com/office/powerpoint/2010/main" val="3327077398"/>
       </p:ext>
     </p:extLst>
   </p:cSld>
@@ -1983,13 +1941,7 @@
       </p:grpSpPr>
       <p:sp>
         <p:nvSpPr>
-          <p:cNvPr id="2" name="Title 1">
-            <a:extLst>
-              <a:ext uri="{FF2B5EF4-FFF2-40B4-BE49-F238E27FC236}">
-                <a16:creationId xmlns:a16="http://schemas.microsoft.com/office/drawing/2014/main" id="{CC2FD8D7-FE66-4712-A5DE-EF80036091D4}"/>
-              </a:ext>
-            </a:extLst>
-          </p:cNvPr>
+          <p:cNvPr id="2" name="Title 1"/>
           <p:cNvSpPr>
             <a:spLocks noGrp="1"/>
           </p:cNvSpPr>
@@ -2006,18 +1958,13 @@
               <a:rPr lang="en-US"/>
               <a:t>Click to edit Master title style</a:t>
             </a:r>
-          </a:p>
-        </p:txBody>
-      </p:sp>
-      <p:sp>
-        <p:nvSpPr>
-          <p:cNvPr id="3" name="Content Placeholder 2">
-            <a:extLst>
-              <a:ext uri="{FF2B5EF4-FFF2-40B4-BE49-F238E27FC236}">
-                <a16:creationId xmlns:a16="http://schemas.microsoft.com/office/drawing/2014/main" id="{D0DD099F-E99F-436C-8B6B-5E48D20C9419}"/>
-              </a:ext>
-            </a:extLst>
-          </p:cNvPr>
+            <a:endParaRPr lang="en-US" dirty="0"/>
+          </a:p>
+        </p:txBody>
+      </p:sp>
+      <p:sp>
+        <p:nvSpPr>
+          <p:cNvPr id="3" name="Content Placeholder 2"/>
           <p:cNvSpPr>
             <a:spLocks noGrp="1"/>
           </p:cNvSpPr>
@@ -2027,13 +1974,41 @@
         </p:nvSpPr>
         <p:spPr>
           <a:xfrm>
-            <a:off x="838200" y="1825625"/>
-            <a:ext cx="5181600" cy="4351338"/>
+            <a:off x="676656" y="1998134"/>
+            <a:ext cx="4663440" cy="3767328"/>
           </a:xfrm>
         </p:spPr>
         <p:txBody>
           <a:bodyPr/>
-          <a:lstStyle/>
+          <a:lstStyle>
+            <a:lvl1pPr>
+              <a:defRPr sz="2400"/>
+            </a:lvl1pPr>
+            <a:lvl2pPr>
+              <a:defRPr sz="2000"/>
+            </a:lvl2pPr>
+            <a:lvl3pPr>
+              <a:defRPr sz="1800"/>
+            </a:lvl3pPr>
+            <a:lvl4pPr>
+              <a:defRPr sz="1600"/>
+            </a:lvl4pPr>
+            <a:lvl5pPr>
+              <a:defRPr sz="1600"/>
+            </a:lvl5pPr>
+            <a:lvl6pPr>
+              <a:defRPr sz="1600"/>
+            </a:lvl6pPr>
+            <a:lvl7pPr>
+              <a:defRPr sz="1600"/>
+            </a:lvl7pPr>
+            <a:lvl8pPr>
+              <a:defRPr sz="1600"/>
+            </a:lvl8pPr>
+            <a:lvl9pPr>
+              <a:defRPr sz="1600"/>
+            </a:lvl9pPr>
+          </a:lstStyle>
           <a:p>
             <a:pPr lvl="0"/>
             <a:r>
@@ -2068,18 +2043,13 @@
               <a:rPr lang="en-US"/>
               <a:t>Fifth level</a:t>
             </a:r>
-          </a:p>
-        </p:txBody>
-      </p:sp>
-      <p:sp>
-        <p:nvSpPr>
-          <p:cNvPr id="4" name="Content Placeholder 3">
-            <a:extLst>
-              <a:ext uri="{FF2B5EF4-FFF2-40B4-BE49-F238E27FC236}">
-                <a16:creationId xmlns:a16="http://schemas.microsoft.com/office/drawing/2014/main" id="{432A84EF-3CC5-4F04-B4CA-C65B93F2264C}"/>
-              </a:ext>
-            </a:extLst>
-          </p:cNvPr>
+            <a:endParaRPr lang="en-US" dirty="0"/>
+          </a:p>
+        </p:txBody>
+      </p:sp>
+      <p:sp>
+        <p:nvSpPr>
+          <p:cNvPr id="4" name="Content Placeholder 3"/>
           <p:cNvSpPr>
             <a:spLocks noGrp="1"/>
           </p:cNvSpPr>
@@ -2089,13 +2059,41 @@
         </p:nvSpPr>
         <p:spPr>
           <a:xfrm>
-            <a:off x="6172200" y="1825625"/>
-            <a:ext cx="5181600" cy="4351338"/>
+            <a:off x="6011330" y="1998134"/>
+            <a:ext cx="4663440" cy="3767328"/>
           </a:xfrm>
         </p:spPr>
         <p:txBody>
           <a:bodyPr/>
-          <a:lstStyle/>
+          <a:lstStyle>
+            <a:lvl1pPr>
+              <a:defRPr sz="2400"/>
+            </a:lvl1pPr>
+            <a:lvl2pPr>
+              <a:defRPr sz="2000"/>
+            </a:lvl2pPr>
+            <a:lvl3pPr>
+              <a:defRPr sz="1800"/>
+            </a:lvl3pPr>
+            <a:lvl4pPr>
+              <a:defRPr sz="1600"/>
+            </a:lvl4pPr>
+            <a:lvl5pPr>
+              <a:defRPr sz="1600"/>
+            </a:lvl5pPr>
+            <a:lvl6pPr>
+              <a:defRPr sz="1600"/>
+            </a:lvl6pPr>
+            <a:lvl7pPr>
+              <a:defRPr sz="1600"/>
+            </a:lvl7pPr>
+            <a:lvl8pPr>
+              <a:defRPr sz="1600"/>
+            </a:lvl8pPr>
+            <a:lvl9pPr>
+              <a:defRPr sz="1600"/>
+            </a:lvl9pPr>
+          </a:lstStyle>
           <a:p>
             <a:pPr lvl="0"/>
             <a:r>
@@ -2130,18 +2128,13 @@
               <a:rPr lang="en-US"/>
               <a:t>Fifth level</a:t>
             </a:r>
-          </a:p>
-        </p:txBody>
-      </p:sp>
-      <p:sp>
-        <p:nvSpPr>
-          <p:cNvPr id="5" name="Date Placeholder 4">
-            <a:extLst>
-              <a:ext uri="{FF2B5EF4-FFF2-40B4-BE49-F238E27FC236}">
-                <a16:creationId xmlns:a16="http://schemas.microsoft.com/office/drawing/2014/main" id="{4E80CEFA-6AFF-4BA8-8002-CC94A3A7238A}"/>
-              </a:ext>
-            </a:extLst>
-          </p:cNvPr>
+            <a:endParaRPr lang="en-US" dirty="0"/>
+          </a:p>
+        </p:txBody>
+      </p:sp>
+      <p:sp>
+        <p:nvSpPr>
+          <p:cNvPr id="5" name="Date Placeholder 4"/>
           <p:cNvSpPr>
             <a:spLocks noGrp="1"/>
           </p:cNvSpPr>
@@ -2156,7 +2149,7 @@
           <a:p>
             <a:fld id="{E9DC5737-47CD-4AF9-B0DD-D5F5337877F4}" type="datetimeFigureOut">
               <a:rPr lang="en-US" smtClean="0"/>
-              <a:t>7/23/2018</a:t>
+              <a:t>7/24/2018</a:t>
             </a:fld>
             <a:endParaRPr lang="en-US"/>
           </a:p>
@@ -2164,13 +2157,7 @@
       </p:sp>
       <p:sp>
         <p:nvSpPr>
-          <p:cNvPr id="6" name="Footer Placeholder 5">
-            <a:extLst>
-              <a:ext uri="{FF2B5EF4-FFF2-40B4-BE49-F238E27FC236}">
-                <a16:creationId xmlns:a16="http://schemas.microsoft.com/office/drawing/2014/main" id="{DC298FE1-F2E5-4D69-AE02-0FC3EA3301A3}"/>
-              </a:ext>
-            </a:extLst>
-          </p:cNvPr>
+          <p:cNvPr id="6" name="Footer Placeholder 5"/>
           <p:cNvSpPr>
             <a:spLocks noGrp="1"/>
           </p:cNvSpPr>
@@ -2189,13 +2176,7 @@
       </p:sp>
       <p:sp>
         <p:nvSpPr>
-          <p:cNvPr id="7" name="Slide Number Placeholder 6">
-            <a:extLst>
-              <a:ext uri="{FF2B5EF4-FFF2-40B4-BE49-F238E27FC236}">
-                <a16:creationId xmlns:a16="http://schemas.microsoft.com/office/drawing/2014/main" id="{F52F588D-C1B6-4B2D-A478-A70E610729D0}"/>
-              </a:ext>
-            </a:extLst>
-          </p:cNvPr>
+          <p:cNvPr id="7" name="Slide Number Placeholder 6"/>
           <p:cNvSpPr>
             <a:spLocks noGrp="1"/>
           </p:cNvSpPr>
@@ -2219,7 +2200,7 @@
     </p:spTree>
     <p:extLst>
       <p:ext uri="{BB962C8B-B14F-4D97-AF65-F5344CB8AC3E}">
-        <p14:creationId xmlns:p14="http://schemas.microsoft.com/office/powerpoint/2010/main" val="3483408664"/>
+        <p14:creationId xmlns:p14="http://schemas.microsoft.com/office/powerpoint/2010/main" val="562848639"/>
       </p:ext>
     </p:extLst>
   </p:cSld>
@@ -2248,65 +2229,59 @@
       </p:grpSpPr>
       <p:sp>
         <p:nvSpPr>
-          <p:cNvPr id="2" name="Title 1">
-            <a:extLst>
-              <a:ext uri="{FF2B5EF4-FFF2-40B4-BE49-F238E27FC236}">
-                <a16:creationId xmlns:a16="http://schemas.microsoft.com/office/drawing/2014/main" id="{F5050214-4C0D-4393-B0E8-1550DA1FFCA1}"/>
-              </a:ext>
-            </a:extLst>
-          </p:cNvPr>
+          <p:cNvPr id="10" name="Title 9"/>
           <p:cNvSpPr>
             <a:spLocks noGrp="1"/>
           </p:cNvSpPr>
           <p:nvPr>
             <p:ph type="title"/>
+          </p:nvPr>
+        </p:nvSpPr>
+        <p:spPr/>
+        <p:txBody>
+          <a:bodyPr/>
+          <a:lstStyle/>
+          <a:p>
+            <a:r>
+              <a:rPr lang="en-US"/>
+              <a:t>Click to edit Master title style</a:t>
+            </a:r>
+            <a:endParaRPr lang="en-US" dirty="0"/>
+          </a:p>
+        </p:txBody>
+      </p:sp>
+      <p:sp>
+        <p:nvSpPr>
+          <p:cNvPr id="3" name="Text Placeholder 2"/>
+          <p:cNvSpPr>
+            <a:spLocks noGrp="1"/>
+          </p:cNvSpPr>
+          <p:nvPr>
+            <p:ph type="body" idx="1"/>
           </p:nvPr>
         </p:nvSpPr>
         <p:spPr>
           <a:xfrm>
-            <a:off x="839788" y="365125"/>
-            <a:ext cx="10515600" cy="1325563"/>
+            <a:off x="676656" y="2040467"/>
+            <a:ext cx="4663440" cy="723400"/>
           </a:xfrm>
         </p:spPr>
         <p:txBody>
-          <a:bodyPr/>
-          <a:lstStyle/>
-          <a:p>
-            <a:r>
-              <a:rPr lang="en-US"/>
-              <a:t>Click to edit Master title style</a:t>
-            </a:r>
-          </a:p>
-        </p:txBody>
-      </p:sp>
-      <p:sp>
-        <p:nvSpPr>
-          <p:cNvPr id="3" name="Text Placeholder 2">
-            <a:extLst>
-              <a:ext uri="{FF2B5EF4-FFF2-40B4-BE49-F238E27FC236}">
-                <a16:creationId xmlns:a16="http://schemas.microsoft.com/office/drawing/2014/main" id="{76F3A9AC-DFBC-4858-9B8E-A272591BAFE6}"/>
-              </a:ext>
-            </a:extLst>
-          </p:cNvPr>
-          <p:cNvSpPr>
-            <a:spLocks noGrp="1"/>
-          </p:cNvSpPr>
-          <p:nvPr>
-            <p:ph type="body" idx="1"/>
-          </p:nvPr>
-        </p:nvSpPr>
-        <p:spPr>
-          <a:xfrm>
-            <a:off x="839788" y="1681163"/>
-            <a:ext cx="5157787" cy="823912"/>
-          </a:xfrm>
-        </p:spPr>
-        <p:txBody>
-          <a:bodyPr anchor="b"/>
+          <a:bodyPr anchor="ctr">
+            <a:normAutofit/>
+          </a:bodyPr>
           <a:lstStyle>
             <a:lvl1pPr marL="0" indent="0">
               <a:buNone/>
-              <a:defRPr sz="2400" b="1"/>
+              <a:defRPr sz="2200" b="0" cap="all" baseline="0">
+                <a:solidFill>
+                  <a:schemeClr val="tx1">
+                    <a:lumMod val="85000"/>
+                    <a:lumOff val="15000"/>
+                  </a:schemeClr>
+                </a:solidFill>
+                <a:latin typeface="+mj-lt"/>
+              </a:defRPr>
             </a:lvl1pPr>
             <a:lvl2pPr marL="457200" indent="0">
               <a:buNone/>
@@ -2352,13 +2327,7 @@
       </p:sp>
       <p:sp>
         <p:nvSpPr>
-          <p:cNvPr id="4" name="Content Placeholder 3">
-            <a:extLst>
-              <a:ext uri="{FF2B5EF4-FFF2-40B4-BE49-F238E27FC236}">
-                <a16:creationId xmlns:a16="http://schemas.microsoft.com/office/drawing/2014/main" id="{4091A794-FA8E-4325-B726-71E780CF935E}"/>
-              </a:ext>
-            </a:extLst>
-          </p:cNvPr>
+          <p:cNvPr id="4" name="Content Placeholder 3"/>
           <p:cNvSpPr>
             <a:spLocks noGrp="1"/>
           </p:cNvSpPr>
@@ -2368,13 +2337,41 @@
         </p:nvSpPr>
         <p:spPr>
           <a:xfrm>
-            <a:off x="839788" y="2505075"/>
-            <a:ext cx="5157787" cy="3684588"/>
+            <a:off x="676656" y="2753084"/>
+            <a:ext cx="4663440" cy="3200400"/>
           </a:xfrm>
         </p:spPr>
         <p:txBody>
           <a:bodyPr/>
-          <a:lstStyle/>
+          <a:lstStyle>
+            <a:lvl1pPr>
+              <a:defRPr sz="2400"/>
+            </a:lvl1pPr>
+            <a:lvl2pPr>
+              <a:defRPr sz="2000"/>
+            </a:lvl2pPr>
+            <a:lvl3pPr>
+              <a:defRPr sz="1800"/>
+            </a:lvl3pPr>
+            <a:lvl4pPr>
+              <a:defRPr sz="1600"/>
+            </a:lvl4pPr>
+            <a:lvl5pPr>
+              <a:defRPr sz="1600"/>
+            </a:lvl5pPr>
+            <a:lvl6pPr>
+              <a:defRPr sz="1600"/>
+            </a:lvl6pPr>
+            <a:lvl7pPr>
+              <a:defRPr sz="1600"/>
+            </a:lvl7pPr>
+            <a:lvl8pPr>
+              <a:defRPr sz="1600"/>
+            </a:lvl8pPr>
+            <a:lvl9pPr>
+              <a:defRPr sz="1600"/>
+            </a:lvl9pPr>
+          </a:lstStyle>
           <a:p>
             <a:pPr lvl="0"/>
             <a:r>
@@ -2409,18 +2406,13 @@
               <a:rPr lang="en-US"/>
               <a:t>Fifth level</a:t>
             </a:r>
-          </a:p>
-        </p:txBody>
-      </p:sp>
-      <p:sp>
-        <p:nvSpPr>
-          <p:cNvPr id="5" name="Text Placeholder 4">
-            <a:extLst>
-              <a:ext uri="{FF2B5EF4-FFF2-40B4-BE49-F238E27FC236}">
-                <a16:creationId xmlns:a16="http://schemas.microsoft.com/office/drawing/2014/main" id="{F792596B-5E80-4DDC-856B-08FFBC9DFC65}"/>
-              </a:ext>
-            </a:extLst>
-          </p:cNvPr>
+            <a:endParaRPr lang="en-US" dirty="0"/>
+          </a:p>
+        </p:txBody>
+      </p:sp>
+      <p:sp>
+        <p:nvSpPr>
+          <p:cNvPr id="5" name="Text Placeholder 4"/>
           <p:cNvSpPr>
             <a:spLocks noGrp="1"/>
           </p:cNvSpPr>
@@ -2430,16 +2422,26 @@
         </p:nvSpPr>
         <p:spPr>
           <a:xfrm>
-            <a:off x="6172200" y="1681163"/>
-            <a:ext cx="5183188" cy="823912"/>
+            <a:off x="6007608" y="2038435"/>
+            <a:ext cx="4663440" cy="722376"/>
           </a:xfrm>
         </p:spPr>
         <p:txBody>
-          <a:bodyPr anchor="b"/>
+          <a:bodyPr anchor="ctr">
+            <a:normAutofit/>
+          </a:bodyPr>
           <a:lstStyle>
             <a:lvl1pPr marL="0" indent="0">
               <a:buNone/>
-              <a:defRPr sz="2400" b="1"/>
+              <a:defRPr sz="2200" b="0" cap="all" baseline="0">
+                <a:solidFill>
+                  <a:schemeClr val="tx1">
+                    <a:lumMod val="85000"/>
+                    <a:lumOff val="15000"/>
+                  </a:schemeClr>
+                </a:solidFill>
+                <a:latin typeface="+mj-lt"/>
+              </a:defRPr>
             </a:lvl1pPr>
             <a:lvl2pPr marL="457200" indent="0">
               <a:buNone/>
@@ -2485,13 +2487,7 @@
       </p:sp>
       <p:sp>
         <p:nvSpPr>
-          <p:cNvPr id="6" name="Content Placeholder 5">
-            <a:extLst>
-              <a:ext uri="{FF2B5EF4-FFF2-40B4-BE49-F238E27FC236}">
-                <a16:creationId xmlns:a16="http://schemas.microsoft.com/office/drawing/2014/main" id="{585D9BDE-8BAA-461B-A21C-817C9E23D48E}"/>
-              </a:ext>
-            </a:extLst>
-          </p:cNvPr>
+          <p:cNvPr id="6" name="Content Placeholder 5"/>
           <p:cNvSpPr>
             <a:spLocks noGrp="1"/>
           </p:cNvSpPr>
@@ -2501,13 +2497,41 @@
         </p:nvSpPr>
         <p:spPr>
           <a:xfrm>
-            <a:off x="6172200" y="2505075"/>
-            <a:ext cx="5183188" cy="3684588"/>
+            <a:off x="6007608" y="2750990"/>
+            <a:ext cx="4663440" cy="3200400"/>
           </a:xfrm>
         </p:spPr>
         <p:txBody>
           <a:bodyPr/>
-          <a:lstStyle/>
+          <a:lstStyle>
+            <a:lvl1pPr>
+              <a:defRPr sz="2400"/>
+            </a:lvl1pPr>
+            <a:lvl2pPr>
+              <a:defRPr sz="2000"/>
+            </a:lvl2pPr>
+            <a:lvl3pPr>
+              <a:defRPr sz="1800"/>
+            </a:lvl3pPr>
+            <a:lvl4pPr>
+              <a:defRPr sz="1600"/>
+            </a:lvl4pPr>
+            <a:lvl5pPr>
+              <a:defRPr sz="1600"/>
+            </a:lvl5pPr>
+            <a:lvl6pPr>
+              <a:defRPr sz="1600"/>
+            </a:lvl6pPr>
+            <a:lvl7pPr>
+              <a:defRPr sz="1600"/>
+            </a:lvl7pPr>
+            <a:lvl8pPr>
+              <a:defRPr sz="1600"/>
+            </a:lvl8pPr>
+            <a:lvl9pPr>
+              <a:defRPr sz="1600"/>
+            </a:lvl9pPr>
+          </a:lstStyle>
           <a:p>
             <a:pPr lvl="0"/>
             <a:r>
@@ -2542,18 +2566,13 @@
               <a:rPr lang="en-US"/>
               <a:t>Fifth level</a:t>
             </a:r>
-          </a:p>
-        </p:txBody>
-      </p:sp>
-      <p:sp>
-        <p:nvSpPr>
-          <p:cNvPr id="7" name="Date Placeholder 6">
-            <a:extLst>
-              <a:ext uri="{FF2B5EF4-FFF2-40B4-BE49-F238E27FC236}">
-                <a16:creationId xmlns:a16="http://schemas.microsoft.com/office/drawing/2014/main" id="{5BF28557-67B3-4D0C-A9C2-997DBE28C571}"/>
-              </a:ext>
-            </a:extLst>
-          </p:cNvPr>
+            <a:endParaRPr lang="en-US" dirty="0"/>
+          </a:p>
+        </p:txBody>
+      </p:sp>
+      <p:sp>
+        <p:nvSpPr>
+          <p:cNvPr id="7" name="Date Placeholder 6"/>
           <p:cNvSpPr>
             <a:spLocks noGrp="1"/>
           </p:cNvSpPr>
@@ -2568,7 +2587,7 @@
           <a:p>
             <a:fld id="{E9DC5737-47CD-4AF9-B0DD-D5F5337877F4}" type="datetimeFigureOut">
               <a:rPr lang="en-US" smtClean="0"/>
-              <a:t>7/23/2018</a:t>
+              <a:t>7/24/2018</a:t>
             </a:fld>
             <a:endParaRPr lang="en-US"/>
           </a:p>
@@ -2576,13 +2595,7 @@
       </p:sp>
       <p:sp>
         <p:nvSpPr>
-          <p:cNvPr id="8" name="Footer Placeholder 7">
-            <a:extLst>
-              <a:ext uri="{FF2B5EF4-FFF2-40B4-BE49-F238E27FC236}">
-                <a16:creationId xmlns:a16="http://schemas.microsoft.com/office/drawing/2014/main" id="{6FF6A182-6E44-43CA-A44F-CA8D1E80530E}"/>
-              </a:ext>
-            </a:extLst>
-          </p:cNvPr>
+          <p:cNvPr id="8" name="Footer Placeholder 7"/>
           <p:cNvSpPr>
             <a:spLocks noGrp="1"/>
           </p:cNvSpPr>
@@ -2601,13 +2614,7 @@
       </p:sp>
       <p:sp>
         <p:nvSpPr>
-          <p:cNvPr id="9" name="Slide Number Placeholder 8">
-            <a:extLst>
-              <a:ext uri="{FF2B5EF4-FFF2-40B4-BE49-F238E27FC236}">
-                <a16:creationId xmlns:a16="http://schemas.microsoft.com/office/drawing/2014/main" id="{46EB1A11-78A2-4673-BEE5-E60FF118A25E}"/>
-              </a:ext>
-            </a:extLst>
-          </p:cNvPr>
+          <p:cNvPr id="9" name="Slide Number Placeholder 8"/>
           <p:cNvSpPr>
             <a:spLocks noGrp="1"/>
           </p:cNvSpPr>
@@ -2631,7 +2638,7 @@
     </p:spTree>
     <p:extLst>
       <p:ext uri="{BB962C8B-B14F-4D97-AF65-F5344CB8AC3E}">
-        <p14:creationId xmlns:p14="http://schemas.microsoft.com/office/powerpoint/2010/main" val="2259708466"/>
+        <p14:creationId xmlns:p14="http://schemas.microsoft.com/office/powerpoint/2010/main" val="2440569738"/>
       </p:ext>
     </p:extLst>
   </p:cSld>
@@ -2660,13 +2667,7 @@
       </p:grpSpPr>
       <p:sp>
         <p:nvSpPr>
-          <p:cNvPr id="2" name="Title 1">
-            <a:extLst>
-              <a:ext uri="{FF2B5EF4-FFF2-40B4-BE49-F238E27FC236}">
-                <a16:creationId xmlns:a16="http://schemas.microsoft.com/office/drawing/2014/main" id="{DE7E53EF-3648-4069-B967-A7699EA78413}"/>
-              </a:ext>
-            </a:extLst>
-          </p:cNvPr>
+          <p:cNvPr id="6" name="Title 5"/>
           <p:cNvSpPr>
             <a:spLocks noGrp="1"/>
           </p:cNvSpPr>
@@ -2683,18 +2684,13 @@
               <a:rPr lang="en-US"/>
               <a:t>Click to edit Master title style</a:t>
             </a:r>
-          </a:p>
-        </p:txBody>
-      </p:sp>
-      <p:sp>
-        <p:nvSpPr>
-          <p:cNvPr id="3" name="Date Placeholder 2">
-            <a:extLst>
-              <a:ext uri="{FF2B5EF4-FFF2-40B4-BE49-F238E27FC236}">
-                <a16:creationId xmlns:a16="http://schemas.microsoft.com/office/drawing/2014/main" id="{2618C6F1-98EB-4D57-AC14-172E711D92C1}"/>
-              </a:ext>
-            </a:extLst>
-          </p:cNvPr>
+            <a:endParaRPr lang="en-US" dirty="0"/>
+          </a:p>
+        </p:txBody>
+      </p:sp>
+      <p:sp>
+        <p:nvSpPr>
+          <p:cNvPr id="3" name="Date Placeholder 2"/>
           <p:cNvSpPr>
             <a:spLocks noGrp="1"/>
           </p:cNvSpPr>
@@ -2709,7 +2705,7 @@
           <a:p>
             <a:fld id="{E9DC5737-47CD-4AF9-B0DD-D5F5337877F4}" type="datetimeFigureOut">
               <a:rPr lang="en-US" smtClean="0"/>
-              <a:t>7/23/2018</a:t>
+              <a:t>7/24/2018</a:t>
             </a:fld>
             <a:endParaRPr lang="en-US"/>
           </a:p>
@@ -2717,13 +2713,7 @@
       </p:sp>
       <p:sp>
         <p:nvSpPr>
-          <p:cNvPr id="4" name="Footer Placeholder 3">
-            <a:extLst>
-              <a:ext uri="{FF2B5EF4-FFF2-40B4-BE49-F238E27FC236}">
-                <a16:creationId xmlns:a16="http://schemas.microsoft.com/office/drawing/2014/main" id="{869CC3A2-5F09-4BBC-AF94-6984AA2879DB}"/>
-              </a:ext>
-            </a:extLst>
-          </p:cNvPr>
+          <p:cNvPr id="4" name="Footer Placeholder 3"/>
           <p:cNvSpPr>
             <a:spLocks noGrp="1"/>
           </p:cNvSpPr>
@@ -2742,13 +2732,7 @@
       </p:sp>
       <p:sp>
         <p:nvSpPr>
-          <p:cNvPr id="5" name="Slide Number Placeholder 4">
-            <a:extLst>
-              <a:ext uri="{FF2B5EF4-FFF2-40B4-BE49-F238E27FC236}">
-                <a16:creationId xmlns:a16="http://schemas.microsoft.com/office/drawing/2014/main" id="{5C452C24-CD41-4930-894E-30DE725807F9}"/>
-              </a:ext>
-            </a:extLst>
-          </p:cNvPr>
+          <p:cNvPr id="5" name="Slide Number Placeholder 4"/>
           <p:cNvSpPr>
             <a:spLocks noGrp="1"/>
           </p:cNvSpPr>
@@ -2772,7 +2756,7 @@
     </p:spTree>
     <p:extLst>
       <p:ext uri="{BB962C8B-B14F-4D97-AF65-F5344CB8AC3E}">
-        <p14:creationId xmlns:p14="http://schemas.microsoft.com/office/powerpoint/2010/main" val="705253286"/>
+        <p14:creationId xmlns:p14="http://schemas.microsoft.com/office/powerpoint/2010/main" val="671211415"/>
       </p:ext>
     </p:extLst>
   </p:cSld>
@@ -2801,13 +2785,7 @@
       </p:grpSpPr>
       <p:sp>
         <p:nvSpPr>
-          <p:cNvPr id="2" name="Date Placeholder 1">
-            <a:extLst>
-              <a:ext uri="{FF2B5EF4-FFF2-40B4-BE49-F238E27FC236}">
-                <a16:creationId xmlns:a16="http://schemas.microsoft.com/office/drawing/2014/main" id="{04C0691B-B0B6-44C9-865A-553A71163A44}"/>
-              </a:ext>
-            </a:extLst>
-          </p:cNvPr>
+          <p:cNvPr id="2" name="Date Placeholder 1"/>
           <p:cNvSpPr>
             <a:spLocks noGrp="1"/>
           </p:cNvSpPr>
@@ -2822,7 +2800,7 @@
           <a:p>
             <a:fld id="{E9DC5737-47CD-4AF9-B0DD-D5F5337877F4}" type="datetimeFigureOut">
               <a:rPr lang="en-US" smtClean="0"/>
-              <a:t>7/23/2018</a:t>
+              <a:t>7/24/2018</a:t>
             </a:fld>
             <a:endParaRPr lang="en-US"/>
           </a:p>
@@ -2830,13 +2808,7 @@
       </p:sp>
       <p:sp>
         <p:nvSpPr>
-          <p:cNvPr id="3" name="Footer Placeholder 2">
-            <a:extLst>
-              <a:ext uri="{FF2B5EF4-FFF2-40B4-BE49-F238E27FC236}">
-                <a16:creationId xmlns:a16="http://schemas.microsoft.com/office/drawing/2014/main" id="{8F5C5535-F087-4162-95F6-8ED4ED538D82}"/>
-              </a:ext>
-            </a:extLst>
-          </p:cNvPr>
+          <p:cNvPr id="3" name="Footer Placeholder 2"/>
           <p:cNvSpPr>
             <a:spLocks noGrp="1"/>
           </p:cNvSpPr>
@@ -2855,13 +2827,7 @@
       </p:sp>
       <p:sp>
         <p:nvSpPr>
-          <p:cNvPr id="4" name="Slide Number Placeholder 3">
-            <a:extLst>
-              <a:ext uri="{FF2B5EF4-FFF2-40B4-BE49-F238E27FC236}">
-                <a16:creationId xmlns:a16="http://schemas.microsoft.com/office/drawing/2014/main" id="{C6910B88-B3C3-4693-B3FF-89DA209A8496}"/>
-              </a:ext>
-            </a:extLst>
-          </p:cNvPr>
+          <p:cNvPr id="4" name="Slide Number Placeholder 3"/>
           <p:cNvSpPr>
             <a:spLocks noGrp="1"/>
           </p:cNvSpPr>
@@ -2885,7 +2851,7 @@
     </p:spTree>
     <p:extLst>
       <p:ext uri="{BB962C8B-B14F-4D97-AF65-F5344CB8AC3E}">
-        <p14:creationId xmlns:p14="http://schemas.microsoft.com/office/powerpoint/2010/main" val="3577306196"/>
+        <p14:creationId xmlns:p14="http://schemas.microsoft.com/office/powerpoint/2010/main" val="2571175587"/>
       </p:ext>
     </p:extLst>
   </p:cSld>
@@ -2914,31 +2880,69 @@
       </p:grpSpPr>
       <p:sp>
         <p:nvSpPr>
-          <p:cNvPr id="2" name="Title 1">
-            <a:extLst>
-              <a:ext uri="{FF2B5EF4-FFF2-40B4-BE49-F238E27FC236}">
-                <a16:creationId xmlns:a16="http://schemas.microsoft.com/office/drawing/2014/main" id="{D6DB2D03-4C6A-41CC-8DF0-87575C647E04}"/>
-              </a:ext>
-            </a:extLst>
-          </p:cNvPr>
-          <p:cNvSpPr>
-            <a:spLocks noGrp="1"/>
-          </p:cNvSpPr>
-          <p:nvPr>
-            <p:ph type="title"/>
-          </p:nvPr>
+          <p:cNvPr id="2" name="Rectangle 1"/>
+          <p:cNvSpPr/>
+          <p:nvPr/>
         </p:nvSpPr>
         <p:spPr>
           <a:xfrm>
-            <a:off x="839788" y="457200"/>
-            <a:ext cx="3932237" cy="1600200"/>
+            <a:off x="7620000" y="0"/>
+            <a:ext cx="4572000" cy="6858000"/>
+          </a:xfrm>
+          <a:prstGeom prst="rect">
+            <a:avLst/>
+          </a:prstGeom>
+          <a:ln>
+            <a:noFill/>
+          </a:ln>
+        </p:spPr>
+        <p:style>
+          <a:lnRef idx="2">
+            <a:schemeClr val="accent1">
+              <a:shade val="50000"/>
+            </a:schemeClr>
+          </a:lnRef>
+          <a:fillRef idx="1">
+            <a:schemeClr val="accent1"/>
+          </a:fillRef>
+          <a:effectRef idx="0">
+            <a:schemeClr val="accent1"/>
+          </a:effectRef>
+          <a:fontRef idx="minor">
+            <a:schemeClr val="lt1"/>
+          </a:fontRef>
+        </p:style>
+      </p:sp>
+      <p:sp>
+        <p:nvSpPr>
+          <p:cNvPr id="9" name="Title 8"/>
+          <p:cNvSpPr>
+            <a:spLocks noGrp="1"/>
+          </p:cNvSpPr>
+          <p:nvPr>
+            <p:ph type="title"/>
+          </p:nvPr>
+        </p:nvSpPr>
+        <p:spPr>
+          <a:xfrm>
+            <a:off x="8261404" y="542282"/>
+            <a:ext cx="3383280" cy="1920240"/>
           </a:xfrm>
         </p:spPr>
         <p:txBody>
-          <a:bodyPr anchor="b"/>
+          <a:bodyPr anchor="b">
+            <a:noAutofit/>
+          </a:bodyPr>
           <a:lstStyle>
             <a:lvl1pPr>
-              <a:defRPr sz="3200"/>
+              <a:lnSpc>
+                <a:spcPct val="85000"/>
+              </a:lnSpc>
+              <a:defRPr sz="4000">
+                <a:solidFill>
+                  <a:srgbClr val="FFFFFF"/>
+                </a:solidFill>
+              </a:defRPr>
             </a:lvl1pPr>
           </a:lstStyle>
           <a:p>
@@ -2946,18 +2950,13 @@
               <a:rPr lang="en-US"/>
               <a:t>Click to edit Master title style</a:t>
             </a:r>
-          </a:p>
-        </p:txBody>
-      </p:sp>
-      <p:sp>
-        <p:nvSpPr>
-          <p:cNvPr id="3" name="Content Placeholder 2">
-            <a:extLst>
-              <a:ext uri="{FF2B5EF4-FFF2-40B4-BE49-F238E27FC236}">
-                <a16:creationId xmlns:a16="http://schemas.microsoft.com/office/drawing/2014/main" id="{4641F1F2-8631-45B6-8925-B1C16F2D35F1}"/>
-              </a:ext>
-            </a:extLst>
-          </p:cNvPr>
+            <a:endParaRPr lang="en-US" dirty="0"/>
+          </a:p>
+        </p:txBody>
+      </p:sp>
+      <p:sp>
+        <p:nvSpPr>
+          <p:cNvPr id="3" name="Content Placeholder 2"/>
           <p:cNvSpPr>
             <a:spLocks noGrp="1"/>
           </p:cNvSpPr>
@@ -2967,8 +2966,8 @@
         </p:nvSpPr>
         <p:spPr>
           <a:xfrm>
-            <a:off x="5183188" y="987425"/>
-            <a:ext cx="6172200" cy="4873625"/>
+            <a:off x="762000" y="762000"/>
+            <a:ext cx="6096000" cy="4572000"/>
           </a:xfrm>
         </p:spPr>
         <p:txBody>
@@ -3036,18 +3035,13 @@
               <a:rPr lang="en-US"/>
               <a:t>Fifth level</a:t>
             </a:r>
-          </a:p>
-        </p:txBody>
-      </p:sp>
-      <p:sp>
-        <p:nvSpPr>
-          <p:cNvPr id="4" name="Text Placeholder 3">
-            <a:extLst>
-              <a:ext uri="{FF2B5EF4-FFF2-40B4-BE49-F238E27FC236}">
-                <a16:creationId xmlns:a16="http://schemas.microsoft.com/office/drawing/2014/main" id="{5F74D958-EAEC-4978-A2F0-29AC6A8268F3}"/>
-              </a:ext>
-            </a:extLst>
-          </p:cNvPr>
+            <a:endParaRPr lang="en-US" dirty="0"/>
+          </a:p>
+        </p:txBody>
+      </p:sp>
+      <p:sp>
+        <p:nvSpPr>
+          <p:cNvPr id="4" name="Text Placeholder 3"/>
           <p:cNvSpPr>
             <a:spLocks noGrp="1"/>
           </p:cNvSpPr>
@@ -3057,52 +3051,87 @@
         </p:nvSpPr>
         <p:spPr>
           <a:xfrm>
-            <a:off x="839788" y="2057400"/>
-            <a:ext cx="3932237" cy="3811588"/>
+            <a:off x="8275982" y="2511813"/>
+            <a:ext cx="3398520" cy="3126987"/>
           </a:xfrm>
         </p:spPr>
         <p:txBody>
-          <a:bodyPr/>
+          <a:bodyPr>
+            <a:normAutofit/>
+          </a:bodyPr>
           <a:lstStyle>
-            <a:lvl1pPr marL="0" indent="0">
-              <a:buNone/>
-              <a:defRPr sz="1600"/>
+            <a:lvl1pPr marL="0" marR="0" indent="0" algn="l" defTabSz="914400" rtl="0" eaLnBrk="1" fontAlgn="auto" latinLnBrk="0" hangingPunct="1">
+              <a:lnSpc>
+                <a:spcPct val="100000"/>
+              </a:lnSpc>
+              <a:spcBef>
+                <a:spcPts val="1200"/>
+              </a:spcBef>
+              <a:spcAft>
+                <a:spcPts val="0"/>
+              </a:spcAft>
+              <a:buClrTx/>
+              <a:buSzTx/>
+              <a:buFontTx/>
+              <a:buNone/>
+              <a:tabLst/>
+              <a:defRPr sz="1800">
+                <a:solidFill>
+                  <a:srgbClr val="262626"/>
+                </a:solidFill>
+              </a:defRPr>
             </a:lvl1pPr>
             <a:lvl2pPr marL="457200" indent="0">
               <a:buNone/>
-              <a:defRPr sz="1400"/>
+              <a:defRPr sz="1200"/>
             </a:lvl2pPr>
             <a:lvl3pPr marL="914400" indent="0">
               <a:buNone/>
-              <a:defRPr sz="1200"/>
+              <a:defRPr sz="1000"/>
             </a:lvl3pPr>
             <a:lvl4pPr marL="1371600" indent="0">
               <a:buNone/>
-              <a:defRPr sz="1000"/>
+              <a:defRPr sz="900"/>
             </a:lvl4pPr>
             <a:lvl5pPr marL="1828800" indent="0">
               <a:buNone/>
-              <a:defRPr sz="1000"/>
+              <a:defRPr sz="900"/>
             </a:lvl5pPr>
             <a:lvl6pPr marL="2286000" indent="0">
               <a:buNone/>
-              <a:defRPr sz="1000"/>
+              <a:defRPr sz="900"/>
             </a:lvl6pPr>
             <a:lvl7pPr marL="2743200" indent="0">
               <a:buNone/>
-              <a:defRPr sz="1000"/>
+              <a:defRPr sz="900"/>
             </a:lvl7pPr>
             <a:lvl8pPr marL="3200400" indent="0">
               <a:buNone/>
-              <a:defRPr sz="1000"/>
+              <a:defRPr sz="900"/>
             </a:lvl8pPr>
             <a:lvl9pPr marL="3657600" indent="0">
               <a:buNone/>
-              <a:defRPr sz="1000"/>
+              <a:defRPr sz="900"/>
             </a:lvl9pPr>
           </a:lstStyle>
           <a:p>
-            <a:pPr lvl="0"/>
+            <a:pPr marL="0" marR="0" lvl="0" indent="0" algn="l" defTabSz="914400" rtl="0" eaLnBrk="1" fontAlgn="auto" latinLnBrk="0" hangingPunct="1">
+              <a:lnSpc>
+                <a:spcPct val="100000"/>
+              </a:lnSpc>
+              <a:spcBef>
+                <a:spcPts val="1400"/>
+              </a:spcBef>
+              <a:spcAft>
+                <a:spcPts val="0"/>
+              </a:spcAft>
+              <a:buClrTx/>
+              <a:buSzTx/>
+              <a:buFontTx/>
+              <a:buNone/>
+              <a:tabLst/>
+              <a:defRPr/>
+            </a:pPr>
             <a:r>
               <a:rPr lang="en-US"/>
               <a:t>Edit Master text styles</a:t>
@@ -3112,13 +3141,7 @@
       </p:sp>
       <p:sp>
         <p:nvSpPr>
-          <p:cNvPr id="5" name="Date Placeholder 4">
-            <a:extLst>
-              <a:ext uri="{FF2B5EF4-FFF2-40B4-BE49-F238E27FC236}">
-                <a16:creationId xmlns:a16="http://schemas.microsoft.com/office/drawing/2014/main" id="{850248D1-B53E-4052-B951-77F6A82ED15B}"/>
-              </a:ext>
-            </a:extLst>
-          </p:cNvPr>
+          <p:cNvPr id="5" name="Date Placeholder 4"/>
           <p:cNvSpPr>
             <a:spLocks noGrp="1"/>
           </p:cNvSpPr>
@@ -3133,7 +3156,7 @@
           <a:p>
             <a:fld id="{E9DC5737-47CD-4AF9-B0DD-D5F5337877F4}" type="datetimeFigureOut">
               <a:rPr lang="en-US" smtClean="0"/>
-              <a:t>7/23/2018</a:t>
+              <a:t>7/24/2018</a:t>
             </a:fld>
             <a:endParaRPr lang="en-US"/>
           </a:p>
@@ -3141,13 +3164,7 @@
       </p:sp>
       <p:sp>
         <p:nvSpPr>
-          <p:cNvPr id="6" name="Footer Placeholder 5">
-            <a:extLst>
-              <a:ext uri="{FF2B5EF4-FFF2-40B4-BE49-F238E27FC236}">
-                <a16:creationId xmlns:a16="http://schemas.microsoft.com/office/drawing/2014/main" id="{8AFE6CCD-70D9-47BA-A873-6C3222104E9D}"/>
-              </a:ext>
-            </a:extLst>
-          </p:cNvPr>
+          <p:cNvPr id="6" name="Footer Placeholder 5"/>
           <p:cNvSpPr>
             <a:spLocks noGrp="1"/>
           </p:cNvSpPr>
@@ -3166,13 +3183,7 @@
       </p:sp>
       <p:sp>
         <p:nvSpPr>
-          <p:cNvPr id="7" name="Slide Number Placeholder 6">
-            <a:extLst>
-              <a:ext uri="{FF2B5EF4-FFF2-40B4-BE49-F238E27FC236}">
-                <a16:creationId xmlns:a16="http://schemas.microsoft.com/office/drawing/2014/main" id="{0EB227E0-00EC-4031-BF11-21F5F5779988}"/>
-              </a:ext>
-            </a:extLst>
-          </p:cNvPr>
+          <p:cNvPr id="7" name="Slide Number Placeholder 6"/>
           <p:cNvSpPr>
             <a:spLocks noGrp="1"/>
           </p:cNvSpPr>
@@ -3183,7 +3194,17 @@
         <p:spPr/>
         <p:txBody>
           <a:bodyPr/>
-          <a:lstStyle/>
+          <a:lstStyle>
+            <a:lvl1pPr>
+              <a:defRPr>
+                <a:solidFill>
+                  <a:srgbClr val="FFFFFF">
+                    <a:alpha val="20000"/>
+                  </a:srgbClr>
+                </a:solidFill>
+              </a:defRPr>
+            </a:lvl1pPr>
+          </a:lstStyle>
           <a:p>
             <a:fld id="{1ED8BE74-FB5D-43C5-8CAD-F66A36645EE8}" type="slidenum">
               <a:rPr lang="en-US" smtClean="0"/>
@@ -3196,7 +3217,7 @@
     </p:spTree>
     <p:extLst>
       <p:ext uri="{BB962C8B-B14F-4D97-AF65-F5344CB8AC3E}">
-        <p14:creationId xmlns:p14="http://schemas.microsoft.com/office/powerpoint/2010/main" val="750715915"/>
+        <p14:creationId xmlns:p14="http://schemas.microsoft.com/office/powerpoint/2010/main" val="1733283886"/>
       </p:ext>
     </p:extLst>
   </p:cSld>
@@ -3209,6 +3230,14 @@
 <file path=ppt/slideLayouts/slideLayout9.xml><?xml version="1.0" encoding="utf-8"?>
 <p:sldLayout xmlns:a="http://schemas.openxmlformats.org/drawingml/2006/main" xmlns:r="http://schemas.openxmlformats.org/officeDocument/2006/relationships" xmlns:p="http://schemas.openxmlformats.org/presentationml/2006/main" type="picTx" preserve="1">
   <p:cSld name="Picture with Caption">
+    <p:bg>
+      <p:bgPr>
+        <a:solidFill>
+          <a:schemeClr val="accent1"/>
+        </a:solidFill>
+        <a:effectLst/>
+      </p:bgPr>
+    </p:bg>
     <p:spTree>
       <p:nvGrpSpPr>
         <p:cNvPr id="1" name=""/>
@@ -3225,13 +3254,7 @@
       </p:grpSpPr>
       <p:sp>
         <p:nvSpPr>
-          <p:cNvPr id="2" name="Title 1">
-            <a:extLst>
-              <a:ext uri="{FF2B5EF4-FFF2-40B4-BE49-F238E27FC236}">
-                <a16:creationId xmlns:a16="http://schemas.microsoft.com/office/drawing/2014/main" id="{D9AF01D3-6B7F-4C3E-AAE1-61039682513D}"/>
-              </a:ext>
-            </a:extLst>
-          </p:cNvPr>
+          <p:cNvPr id="2" name="Title 1"/>
           <p:cNvSpPr>
             <a:spLocks noGrp="1"/>
           </p:cNvSpPr>
@@ -3241,15 +3264,21 @@
         </p:nvSpPr>
         <p:spPr>
           <a:xfrm>
-            <a:off x="839788" y="457200"/>
-            <a:ext cx="3932237" cy="1600200"/>
+            <a:off x="649224" y="5418667"/>
+            <a:ext cx="10780776" cy="613283"/>
           </a:xfrm>
         </p:spPr>
         <p:txBody>
-          <a:bodyPr anchor="b"/>
+          <a:bodyPr anchor="b">
+            <a:normAutofit/>
+          </a:bodyPr>
           <a:lstStyle>
             <a:lvl1pPr>
-              <a:defRPr sz="3200"/>
+              <a:defRPr sz="3200" b="0">
+                <a:solidFill>
+                  <a:srgbClr val="FFFFFF"/>
+                </a:solidFill>
+              </a:defRPr>
             </a:lvl1pPr>
           </a:lstStyle>
           <a:p>
@@ -3257,20 +3286,15 @@
               <a:rPr lang="en-US"/>
               <a:t>Click to edit Master title style</a:t>
             </a:r>
-          </a:p>
-        </p:txBody>
-      </p:sp>
-      <p:sp>
-        <p:nvSpPr>
-          <p:cNvPr id="3" name="Picture Placeholder 2">
-            <a:extLst>
-              <a:ext uri="{FF2B5EF4-FFF2-40B4-BE49-F238E27FC236}">
-                <a16:creationId xmlns:a16="http://schemas.microsoft.com/office/drawing/2014/main" id="{0DF3716D-E0A4-4C24-B1BD-86753EFE3FB3}"/>
-              </a:ext>
-            </a:extLst>
-          </p:cNvPr>
-          <p:cNvSpPr>
-            <a:spLocks noGrp="1"/>
+            <a:endParaRPr lang="en-US" dirty="0"/>
+          </a:p>
+        </p:txBody>
+      </p:sp>
+      <p:sp>
+        <p:nvSpPr>
+          <p:cNvPr id="3" name="Picture Placeholder 2"/>
+          <p:cNvSpPr>
+            <a:spLocks noGrp="1" noChangeAspect="1"/>
           </p:cNvSpPr>
           <p:nvPr>
             <p:ph type="pic" idx="1"/>
@@ -3278,16 +3302,32 @@
         </p:nvSpPr>
         <p:spPr>
           <a:xfrm>
-            <a:off x="5183188" y="987425"/>
-            <a:ext cx="6172200" cy="4873625"/>
+            <a:off x="0" y="0"/>
+            <a:ext cx="12192000" cy="5330952"/>
           </a:xfrm>
+          <a:solidFill>
+            <a:schemeClr val="accent1">
+              <a:lumMod val="40000"/>
+              <a:lumOff val="60000"/>
+            </a:schemeClr>
+          </a:solidFill>
         </p:spPr>
         <p:txBody>
-          <a:bodyPr/>
+          <a:bodyPr anchor="t"/>
           <a:lstStyle>
-            <a:lvl1pPr marL="0" indent="0">
-              <a:buNone/>
-              <a:defRPr sz="3200"/>
+            <a:lvl1pPr marL="0" indent="0" algn="ctr">
+              <a:spcBef>
+                <a:spcPts val="800"/>
+              </a:spcBef>
+              <a:buNone/>
+              <a:defRPr sz="3200">
+                <a:solidFill>
+                  <a:schemeClr val="tx1">
+                    <a:lumMod val="75000"/>
+                    <a:lumOff val="25000"/>
+                  </a:schemeClr>
+                </a:solidFill>
+              </a:defRPr>
             </a:lvl1pPr>
             <a:lvl2pPr marL="457200" indent="0">
               <a:buNone/>
@@ -3323,19 +3363,17 @@
             </a:lvl9pPr>
           </a:lstStyle>
           <a:p>
-            <a:endParaRPr lang="en-US"/>
-          </a:p>
-        </p:txBody>
-      </p:sp>
-      <p:sp>
-        <p:nvSpPr>
-          <p:cNvPr id="4" name="Text Placeholder 3">
-            <a:extLst>
-              <a:ext uri="{FF2B5EF4-FFF2-40B4-BE49-F238E27FC236}">
-                <a16:creationId xmlns:a16="http://schemas.microsoft.com/office/drawing/2014/main" id="{7C78E2D9-71F1-4337-9A48-EA11FE75AE4A}"/>
-              </a:ext>
-            </a:extLst>
-          </p:cNvPr>
+            <a:r>
+              <a:rPr lang="en-US"/>
+              <a:t>Click icon to add picture</a:t>
+            </a:r>
+            <a:endParaRPr lang="en-US" dirty="0"/>
+          </a:p>
+        </p:txBody>
+      </p:sp>
+      <p:sp>
+        <p:nvSpPr>
+          <p:cNvPr id="4" name="Text Placeholder 3"/>
           <p:cNvSpPr>
             <a:spLocks noGrp="1"/>
           </p:cNvSpPr>
@@ -3345,48 +3383,57 @@
         </p:nvSpPr>
         <p:spPr>
           <a:xfrm>
-            <a:off x="839788" y="2057400"/>
-            <a:ext cx="3932237" cy="3811588"/>
+            <a:off x="676656" y="5909735"/>
+            <a:ext cx="9229344" cy="533400"/>
           </a:xfrm>
         </p:spPr>
         <p:txBody>
-          <a:bodyPr/>
+          <a:bodyPr>
+            <a:normAutofit/>
+          </a:bodyPr>
           <a:lstStyle>
             <a:lvl1pPr marL="0" indent="0">
-              <a:buNone/>
-              <a:defRPr sz="1600"/>
+              <a:lnSpc>
+                <a:spcPct val="90000"/>
+              </a:lnSpc>
+              <a:buNone/>
+              <a:defRPr sz="1400">
+                <a:solidFill>
+                  <a:srgbClr val="262626"/>
+                </a:solidFill>
+              </a:defRPr>
             </a:lvl1pPr>
             <a:lvl2pPr marL="457200" indent="0">
               <a:buNone/>
-              <a:defRPr sz="1400"/>
+              <a:defRPr sz="1200"/>
             </a:lvl2pPr>
             <a:lvl3pPr marL="914400" indent="0">
               <a:buNone/>
-              <a:defRPr sz="1200"/>
+              <a:defRPr sz="1000"/>
             </a:lvl3pPr>
             <a:lvl4pPr marL="1371600" indent="0">
               <a:buNone/>
-              <a:defRPr sz="1000"/>
+              <a:defRPr sz="900"/>
             </a:lvl4pPr>
             <a:lvl5pPr marL="1828800" indent="0">
               <a:buNone/>
-              <a:defRPr sz="1000"/>
+              <a:defRPr sz="900"/>
             </a:lvl5pPr>
             <a:lvl6pPr marL="2286000" indent="0">
               <a:buNone/>
-              <a:defRPr sz="1000"/>
+              <a:defRPr sz="900"/>
             </a:lvl6pPr>
             <a:lvl7pPr marL="2743200" indent="0">
               <a:buNone/>
-              <a:defRPr sz="1000"/>
+              <a:defRPr sz="900"/>
             </a:lvl7pPr>
             <a:lvl8pPr marL="3200400" indent="0">
               <a:buNone/>
-              <a:defRPr sz="1000"/>
+              <a:defRPr sz="900"/>
             </a:lvl8pPr>
             <a:lvl9pPr marL="3657600" indent="0">
               <a:buNone/>
-              <a:defRPr sz="1000"/>
+              <a:defRPr sz="900"/>
             </a:lvl9pPr>
           </a:lstStyle>
           <a:p>
@@ -3400,13 +3447,7 @@
       </p:sp>
       <p:sp>
         <p:nvSpPr>
-          <p:cNvPr id="5" name="Date Placeholder 4">
-            <a:extLst>
-              <a:ext uri="{FF2B5EF4-FFF2-40B4-BE49-F238E27FC236}">
-                <a16:creationId xmlns:a16="http://schemas.microsoft.com/office/drawing/2014/main" id="{C47FC9C5-010E-49B5-8618-24DDFC68C5BD}"/>
-              </a:ext>
-            </a:extLst>
-          </p:cNvPr>
+          <p:cNvPr id="12" name="Date Placeholder 11"/>
           <p:cNvSpPr>
             <a:spLocks noGrp="1"/>
           </p:cNvSpPr>
@@ -3417,11 +3458,21 @@
         <p:spPr/>
         <p:txBody>
           <a:bodyPr/>
-          <a:lstStyle/>
+          <a:lstStyle>
+            <a:lvl1pPr>
+              <a:defRPr>
+                <a:solidFill>
+                  <a:srgbClr val="FFFFFF">
+                    <a:alpha val="80000"/>
+                  </a:srgbClr>
+                </a:solidFill>
+              </a:defRPr>
+            </a:lvl1pPr>
+          </a:lstStyle>
           <a:p>
             <a:fld id="{E9DC5737-47CD-4AF9-B0DD-D5F5337877F4}" type="datetimeFigureOut">
               <a:rPr lang="en-US" smtClean="0"/>
-              <a:t>7/23/2018</a:t>
+              <a:t>7/24/2018</a:t>
             </a:fld>
             <a:endParaRPr lang="en-US"/>
           </a:p>
@@ -3429,13 +3480,7 @@
       </p:sp>
       <p:sp>
         <p:nvSpPr>
-          <p:cNvPr id="6" name="Footer Placeholder 5">
-            <a:extLst>
-              <a:ext uri="{FF2B5EF4-FFF2-40B4-BE49-F238E27FC236}">
-                <a16:creationId xmlns:a16="http://schemas.microsoft.com/office/drawing/2014/main" id="{59F6E936-645F-4FE8-BFA0-352ADD31FD87}"/>
-              </a:ext>
-            </a:extLst>
-          </p:cNvPr>
+          <p:cNvPr id="13" name="Footer Placeholder 12"/>
           <p:cNvSpPr>
             <a:spLocks noGrp="1"/>
           </p:cNvSpPr>
@@ -3446,7 +3491,17 @@
         <p:spPr/>
         <p:txBody>
           <a:bodyPr/>
-          <a:lstStyle/>
+          <a:lstStyle>
+            <a:lvl1pPr>
+              <a:defRPr>
+                <a:solidFill>
+                  <a:srgbClr val="FFFFFF">
+                    <a:alpha val="80000"/>
+                  </a:srgbClr>
+                </a:solidFill>
+              </a:defRPr>
+            </a:lvl1pPr>
+          </a:lstStyle>
           <a:p>
             <a:endParaRPr lang="en-US"/>
           </a:p>
@@ -3454,13 +3509,7 @@
       </p:sp>
       <p:sp>
         <p:nvSpPr>
-          <p:cNvPr id="7" name="Slide Number Placeholder 6">
-            <a:extLst>
-              <a:ext uri="{FF2B5EF4-FFF2-40B4-BE49-F238E27FC236}">
-                <a16:creationId xmlns:a16="http://schemas.microsoft.com/office/drawing/2014/main" id="{30D46C6F-E7B7-41A2-8725-5CD44274F676}"/>
-              </a:ext>
-            </a:extLst>
-          </p:cNvPr>
+          <p:cNvPr id="14" name="Slide Number Placeholder 13"/>
           <p:cNvSpPr>
             <a:spLocks noGrp="1"/>
           </p:cNvSpPr>
@@ -3471,7 +3520,17 @@
         <p:spPr/>
         <p:txBody>
           <a:bodyPr/>
-          <a:lstStyle/>
+          <a:lstStyle>
+            <a:lvl1pPr>
+              <a:defRPr>
+                <a:solidFill>
+                  <a:srgbClr val="FFFFFF">
+                    <a:alpha val="25000"/>
+                  </a:srgbClr>
+                </a:solidFill>
+              </a:defRPr>
+            </a:lvl1pPr>
+          </a:lstStyle>
           <a:p>
             <a:fld id="{1ED8BE74-FB5D-43C5-8CAD-F66A36645EE8}" type="slidenum">
               <a:rPr lang="en-US" smtClean="0"/>
@@ -3484,12 +3543,12 @@
     </p:spTree>
     <p:extLst>
       <p:ext uri="{BB962C8B-B14F-4D97-AF65-F5344CB8AC3E}">
-        <p14:creationId xmlns:p14="http://schemas.microsoft.com/office/powerpoint/2010/main" val="3019689044"/>
+        <p14:creationId xmlns:p14="http://schemas.microsoft.com/office/powerpoint/2010/main" val="1540187236"/>
       </p:ext>
     </p:extLst>
   </p:cSld>
   <p:clrMapOvr>
-    <a:masterClrMapping/>
+    <a:overrideClrMapping bg1="lt1" tx1="dk1" bg2="lt2" tx2="dk2" accent1="accent1" accent2="accent2" accent3="accent3" accent4="accent4" accent5="accent5" accent6="accent6" hlink="hlink" folHlink="folHlink"/>
   </p:clrMapOvr>
 </p:sldLayout>
 </file>
@@ -3518,13 +3577,7 @@
       </p:grpSpPr>
       <p:sp>
         <p:nvSpPr>
-          <p:cNvPr id="2" name="Title Placeholder 1">
-            <a:extLst>
-              <a:ext uri="{FF2B5EF4-FFF2-40B4-BE49-F238E27FC236}">
-                <a16:creationId xmlns:a16="http://schemas.microsoft.com/office/drawing/2014/main" id="{04DF46D6-4EC0-4BDB-BDDB-73EB9F3D5B32}"/>
-              </a:ext>
-            </a:extLst>
-          </p:cNvPr>
+          <p:cNvPr id="2" name="Title Placeholder 1"/>
           <p:cNvSpPr>
             <a:spLocks noGrp="1"/>
           </p:cNvSpPr>
@@ -3534,8 +3587,8 @@
         </p:nvSpPr>
         <p:spPr>
           <a:xfrm>
-            <a:off x="838200" y="365125"/>
-            <a:ext cx="10515600" cy="1325563"/>
+            <a:off x="657224" y="499533"/>
+            <a:ext cx="10772775" cy="1658198"/>
           </a:xfrm>
           <a:prstGeom prst="rect">
             <a:avLst/>
@@ -3551,18 +3604,13 @@
               <a:rPr lang="en-US"/>
               <a:t>Click to edit Master title style</a:t>
             </a:r>
-          </a:p>
-        </p:txBody>
-      </p:sp>
-      <p:sp>
-        <p:nvSpPr>
-          <p:cNvPr id="3" name="Text Placeholder 2">
-            <a:extLst>
-              <a:ext uri="{FF2B5EF4-FFF2-40B4-BE49-F238E27FC236}">
-                <a16:creationId xmlns:a16="http://schemas.microsoft.com/office/drawing/2014/main" id="{A3AFA1CD-FED0-462B-B7D4-7DD41638A9BA}"/>
-              </a:ext>
-            </a:extLst>
-          </p:cNvPr>
+            <a:endParaRPr lang="en-US" dirty="0"/>
+          </a:p>
+        </p:txBody>
+      </p:sp>
+      <p:sp>
+        <p:nvSpPr>
+          <p:cNvPr id="3" name="Text Placeholder 2"/>
           <p:cNvSpPr>
             <a:spLocks noGrp="1"/>
           </p:cNvSpPr>
@@ -3572,8 +3620,8 @@
         </p:nvSpPr>
         <p:spPr>
           <a:xfrm>
-            <a:off x="838200" y="1825625"/>
-            <a:ext cx="10515600" cy="4351338"/>
+            <a:off x="676656" y="2011680"/>
+            <a:ext cx="10753725" cy="3766185"/>
           </a:xfrm>
           <a:prstGeom prst="rect">
             <a:avLst/>
@@ -3618,18 +3666,13 @@
               <a:rPr lang="en-US"/>
               <a:t>Fifth level</a:t>
             </a:r>
-          </a:p>
-        </p:txBody>
-      </p:sp>
-      <p:sp>
-        <p:nvSpPr>
-          <p:cNvPr id="4" name="Date Placeholder 3">
-            <a:extLst>
-              <a:ext uri="{FF2B5EF4-FFF2-40B4-BE49-F238E27FC236}">
-                <a16:creationId xmlns:a16="http://schemas.microsoft.com/office/drawing/2014/main" id="{E5CDB1C9-5DBC-4EE4-AA1F-F6A253846C8E}"/>
-              </a:ext>
-            </a:extLst>
-          </p:cNvPr>
+            <a:endParaRPr lang="en-US" dirty="0"/>
+          </a:p>
+        </p:txBody>
+      </p:sp>
+      <p:sp>
+        <p:nvSpPr>
+          <p:cNvPr id="4" name="Date Placeholder 3"/>
           <p:cNvSpPr>
             <a:spLocks noGrp="1"/>
           </p:cNvSpPr>
@@ -3639,8 +3682,8 @@
         </p:nvSpPr>
         <p:spPr>
           <a:xfrm>
-            <a:off x="838200" y="6356350"/>
-            <a:ext cx="2743200" cy="365125"/>
+            <a:off x="685800" y="6412447"/>
+            <a:ext cx="4114800" cy="228600"/>
           </a:xfrm>
           <a:prstGeom prst="rect">
             <a:avLst/>
@@ -3650,10 +3693,10 @@
           <a:bodyPr vert="horz" lIns="91440" tIns="45720" rIns="91440" bIns="45720" rtlCol="0" anchor="ctr"/>
           <a:lstStyle>
             <a:lvl1pPr algn="l">
-              <a:defRPr sz="1200">
+              <a:defRPr sz="950">
                 <a:solidFill>
                   <a:schemeClr val="tx1">
-                    <a:tint val="75000"/>
+                    <a:alpha val="80000"/>
                   </a:schemeClr>
                 </a:solidFill>
               </a:defRPr>
@@ -3662,7 +3705,7 @@
           <a:p>
             <a:fld id="{E9DC5737-47CD-4AF9-B0DD-D5F5337877F4}" type="datetimeFigureOut">
               <a:rPr lang="en-US" smtClean="0"/>
-              <a:t>7/23/2018</a:t>
+              <a:t>7/24/2018</a:t>
             </a:fld>
             <a:endParaRPr lang="en-US"/>
           </a:p>
@@ -3670,13 +3713,7 @@
       </p:sp>
       <p:sp>
         <p:nvSpPr>
-          <p:cNvPr id="5" name="Footer Placeholder 4">
-            <a:extLst>
-              <a:ext uri="{FF2B5EF4-FFF2-40B4-BE49-F238E27FC236}">
-                <a16:creationId xmlns:a16="http://schemas.microsoft.com/office/drawing/2014/main" id="{CC5C5111-C253-463A-9BFB-03D0989ED4A2}"/>
-              </a:ext>
-            </a:extLst>
-          </p:cNvPr>
+          <p:cNvPr id="5" name="Footer Placeholder 4"/>
           <p:cNvSpPr>
             <a:spLocks noGrp="1"/>
           </p:cNvSpPr>
@@ -3686,8 +3723,8 @@
         </p:nvSpPr>
         <p:spPr>
           <a:xfrm>
-            <a:off x="4038600" y="6356350"/>
-            <a:ext cx="4114800" cy="365125"/>
+            <a:off x="685800" y="6554697"/>
+            <a:ext cx="5029200" cy="228600"/>
           </a:xfrm>
           <a:prstGeom prst="rect">
             <a:avLst/>
@@ -3696,11 +3733,11 @@
         <p:txBody>
           <a:bodyPr vert="horz" lIns="91440" tIns="45720" rIns="91440" bIns="45720" rtlCol="0" anchor="ctr"/>
           <a:lstStyle>
-            <a:lvl1pPr algn="ctr">
-              <a:defRPr sz="1200">
+            <a:lvl1pPr algn="l">
+              <a:defRPr sz="950" cap="all" baseline="0">
                 <a:solidFill>
                   <a:schemeClr val="tx1">
-                    <a:tint val="75000"/>
+                    <a:alpha val="80000"/>
                   </a:schemeClr>
                 </a:solidFill>
               </a:defRPr>
@@ -3713,13 +3750,7 @@
       </p:sp>
       <p:sp>
         <p:nvSpPr>
-          <p:cNvPr id="6" name="Slide Number Placeholder 5">
-            <a:extLst>
-              <a:ext uri="{FF2B5EF4-FFF2-40B4-BE49-F238E27FC236}">
-                <a16:creationId xmlns:a16="http://schemas.microsoft.com/office/drawing/2014/main" id="{645CBA2F-B486-40B5-AEF0-169AA0A9E7FC}"/>
-              </a:ext>
-            </a:extLst>
-          </p:cNvPr>
+          <p:cNvPr id="6" name="Slide Number Placeholder 5"/>
           <p:cNvSpPr>
             <a:spLocks noGrp="1"/>
           </p:cNvSpPr>
@@ -3729,23 +3760,27 @@
         </p:nvSpPr>
         <p:spPr>
           <a:xfrm>
-            <a:off x="8610600" y="6356350"/>
-            <a:ext cx="2743200" cy="365125"/>
+            <a:off x="8763926" y="5876412"/>
+            <a:ext cx="2926080" cy="1397039"/>
           </a:xfrm>
           <a:prstGeom prst="rect">
             <a:avLst/>
           </a:prstGeom>
         </p:spPr>
         <p:txBody>
-          <a:bodyPr vert="horz" lIns="91440" tIns="45720" rIns="91440" bIns="45720" rtlCol="0" anchor="ctr"/>
+          <a:bodyPr vert="horz" lIns="91440" tIns="45720" rIns="91440" bIns="45720" rtlCol="0" anchor="b"/>
           <a:lstStyle>
             <a:lvl1pPr algn="r">
-              <a:defRPr sz="1200">
+              <a:defRPr sz="10300" b="0">
+                <a:ln>
+                  <a:noFill/>
+                </a:ln>
                 <a:solidFill>
-                  <a:schemeClr val="tx1">
-                    <a:tint val="75000"/>
+                  <a:schemeClr val="accent1">
+                    <a:alpha val="25000"/>
                   </a:schemeClr>
                 </a:solidFill>
+                <a:latin typeface="+mj-lt"/>
               </a:defRPr>
             </a:lvl1pPr>
           </a:lstStyle>
@@ -3761,37 +3796,37 @@
     </p:spTree>
     <p:extLst>
       <p:ext uri="{BB962C8B-B14F-4D97-AF65-F5344CB8AC3E}">
-        <p14:creationId xmlns:p14="http://schemas.microsoft.com/office/powerpoint/2010/main" val="1489991346"/>
+        <p14:creationId xmlns:p14="http://schemas.microsoft.com/office/powerpoint/2010/main" val="795038332"/>
       </p:ext>
     </p:extLst>
   </p:cSld>
   <p:clrMap bg1="lt1" tx1="dk1" bg2="lt2" tx2="dk2" accent1="accent1" accent2="accent2" accent3="accent3" accent4="accent4" accent5="accent5" accent6="accent6" hlink="hlink" folHlink="folHlink"/>
   <p:sldLayoutIdLst>
-    <p:sldLayoutId id="2147483649" r:id="rId1"/>
-    <p:sldLayoutId id="2147483650" r:id="rId2"/>
-    <p:sldLayoutId id="2147483651" r:id="rId3"/>
-    <p:sldLayoutId id="2147483652" r:id="rId4"/>
-    <p:sldLayoutId id="2147483653" r:id="rId5"/>
-    <p:sldLayoutId id="2147483654" r:id="rId6"/>
-    <p:sldLayoutId id="2147483655" r:id="rId7"/>
-    <p:sldLayoutId id="2147483656" r:id="rId8"/>
-    <p:sldLayoutId id="2147483657" r:id="rId9"/>
-    <p:sldLayoutId id="2147483658" r:id="rId10"/>
-    <p:sldLayoutId id="2147483659" r:id="rId11"/>
+    <p:sldLayoutId id="2147483685" r:id="rId1"/>
+    <p:sldLayoutId id="2147483686" r:id="rId2"/>
+    <p:sldLayoutId id="2147483687" r:id="rId3"/>
+    <p:sldLayoutId id="2147483688" r:id="rId4"/>
+    <p:sldLayoutId id="2147483689" r:id="rId5"/>
+    <p:sldLayoutId id="2147483690" r:id="rId6"/>
+    <p:sldLayoutId id="2147483691" r:id="rId7"/>
+    <p:sldLayoutId id="2147483692" r:id="rId8"/>
+    <p:sldLayoutId id="2147483693" r:id="rId9"/>
+    <p:sldLayoutId id="2147483694" r:id="rId10"/>
+    <p:sldLayoutId id="2147483695" r:id="rId11"/>
   </p:sldLayoutIdLst>
   <p:txStyles>
     <p:titleStyle>
       <a:lvl1pPr algn="l" defTabSz="914400" rtl="0" eaLnBrk="1" latinLnBrk="0" hangingPunct="1">
         <a:lnSpc>
-          <a:spcPct val="90000"/>
+          <a:spcPct val="85000"/>
         </a:lnSpc>
         <a:spcBef>
           <a:spcPct val="0"/>
         </a:spcBef>
         <a:buNone/>
-        <a:defRPr sz="4400" kern="1200">
+        <a:defRPr sz="5400" kern="1200" spc="-120" baseline="0">
           <a:solidFill>
-            <a:schemeClr val="tx1"/>
+            <a:schemeClr val="accent1"/>
           </a:solidFill>
           <a:latin typeface="+mj-lt"/>
           <a:ea typeface="+mj-ea"/>
@@ -3800,162 +3835,189 @@
       </a:lvl1pPr>
     </p:titleStyle>
     <p:bodyStyle>
-      <a:lvl1pPr marL="228600" indent="-228600" algn="l" defTabSz="914400" rtl="0" eaLnBrk="1" latinLnBrk="0" hangingPunct="1">
+      <a:lvl1pPr marL="91440" indent="-91440" algn="l" defTabSz="914400" rtl="0" eaLnBrk="1" latinLnBrk="0" hangingPunct="1">
         <a:lnSpc>
-          <a:spcPct val="90000"/>
+          <a:spcPct val="85000"/>
         </a:lnSpc>
         <a:spcBef>
-          <a:spcPts val="1000"/>
+          <a:spcPts val="1300"/>
         </a:spcBef>
-        <a:buFont typeface="Arial" panose="020B0604020202020204" pitchFamily="34" charset="0"/>
-        <a:buChar char="•"/>
-        <a:defRPr sz="2800" kern="1200">
+        <a:buFont typeface="Arial" pitchFamily="34" charset="0"/>
+        <a:buChar char=" "/>
+        <a:defRPr sz="2400" kern="1200">
           <a:solidFill>
-            <a:schemeClr val="tx1"/>
+            <a:schemeClr val="tx1">
+              <a:lumMod val="85000"/>
+              <a:lumOff val="15000"/>
+            </a:schemeClr>
           </a:solidFill>
           <a:latin typeface="+mn-lt"/>
           <a:ea typeface="+mn-ea"/>
           <a:cs typeface="+mn-cs"/>
         </a:defRPr>
       </a:lvl1pPr>
-      <a:lvl2pPr marL="685800" indent="-228600" algn="l" defTabSz="914400" rtl="0" eaLnBrk="1" latinLnBrk="0" hangingPunct="1">
+      <a:lvl2pPr marL="347472" indent="-342900" algn="l" defTabSz="914400" rtl="0" eaLnBrk="1" latinLnBrk="0" hangingPunct="1">
         <a:lnSpc>
-          <a:spcPct val="90000"/>
+          <a:spcPct val="85000"/>
         </a:lnSpc>
         <a:spcBef>
-          <a:spcPts val="500"/>
+          <a:spcPts val="600"/>
         </a:spcBef>
-        <a:buFont typeface="Arial" panose="020B0604020202020204" pitchFamily="34" charset="0"/>
-        <a:buChar char="•"/>
+        <a:buFont typeface="Arial" pitchFamily="34" charset="0"/>
+        <a:buChar char=" "/>
         <a:defRPr sz="2400" kern="1200">
           <a:solidFill>
-            <a:schemeClr val="tx1"/>
+            <a:schemeClr val="tx1">
+              <a:lumMod val="85000"/>
+              <a:lumOff val="15000"/>
+            </a:schemeClr>
           </a:solidFill>
           <a:latin typeface="+mn-lt"/>
           <a:ea typeface="+mn-ea"/>
           <a:cs typeface="+mn-cs"/>
         </a:defRPr>
       </a:lvl2pPr>
-      <a:lvl3pPr marL="1143000" indent="-228600" algn="l" defTabSz="914400" rtl="0" eaLnBrk="1" latinLnBrk="0" hangingPunct="1">
+      <a:lvl3pPr marL="548640" indent="-548640" algn="l" defTabSz="914400" rtl="0" eaLnBrk="1" latinLnBrk="0" hangingPunct="1">
         <a:lnSpc>
-          <a:spcPct val="90000"/>
+          <a:spcPct val="85000"/>
         </a:lnSpc>
         <a:spcBef>
-          <a:spcPts val="500"/>
+          <a:spcPts val="600"/>
         </a:spcBef>
-        <a:buFont typeface="Arial" panose="020B0604020202020204" pitchFamily="34" charset="0"/>
-        <a:buChar char="•"/>
-        <a:defRPr sz="2000" kern="1200">
+        <a:buFont typeface="Arial" pitchFamily="34" charset="0"/>
+        <a:buChar char=" "/>
+        <a:defRPr sz="2000" i="1" kern="1200">
           <a:solidFill>
-            <a:schemeClr val="tx1"/>
+            <a:schemeClr val="tx1">
+              <a:lumMod val="85000"/>
+              <a:lumOff val="15000"/>
+            </a:schemeClr>
           </a:solidFill>
           <a:latin typeface="+mn-lt"/>
           <a:ea typeface="+mn-ea"/>
           <a:cs typeface="+mn-cs"/>
         </a:defRPr>
       </a:lvl3pPr>
-      <a:lvl4pPr marL="1600200" indent="-228600" algn="l" defTabSz="914400" rtl="0" eaLnBrk="1" latinLnBrk="0" hangingPunct="1">
+      <a:lvl4pPr marL="822960" indent="-822960" algn="l" defTabSz="914400" rtl="0" eaLnBrk="1" latinLnBrk="0" hangingPunct="1">
         <a:lnSpc>
-          <a:spcPct val="90000"/>
+          <a:spcPct val="85000"/>
         </a:lnSpc>
         <a:spcBef>
-          <a:spcPts val="500"/>
+          <a:spcPts val="600"/>
         </a:spcBef>
-        <a:buFont typeface="Arial" panose="020B0604020202020204" pitchFamily="34" charset="0"/>
-        <a:buChar char="•"/>
+        <a:buFont typeface="Arial" pitchFamily="34" charset="0"/>
+        <a:buChar char=" "/>
         <a:defRPr sz="1800" kern="1200">
           <a:solidFill>
-            <a:schemeClr val="tx1"/>
+            <a:schemeClr val="tx1">
+              <a:lumMod val="85000"/>
+              <a:lumOff val="15000"/>
+            </a:schemeClr>
           </a:solidFill>
           <a:latin typeface="+mn-lt"/>
           <a:ea typeface="+mn-ea"/>
           <a:cs typeface="+mn-cs"/>
         </a:defRPr>
       </a:lvl4pPr>
-      <a:lvl5pPr marL="2057400" indent="-228600" algn="l" defTabSz="914400" rtl="0" eaLnBrk="1" latinLnBrk="0" hangingPunct="1">
+      <a:lvl5pPr marL="1097280" indent="-1097280" algn="l" defTabSz="914400" rtl="0" eaLnBrk="1" latinLnBrk="0" hangingPunct="1">
         <a:lnSpc>
-          <a:spcPct val="90000"/>
+          <a:spcPct val="85000"/>
         </a:lnSpc>
         <a:spcBef>
-          <a:spcPts val="500"/>
+          <a:spcPts val="600"/>
         </a:spcBef>
-        <a:buFont typeface="Arial" panose="020B0604020202020204" pitchFamily="34" charset="0"/>
-        <a:buChar char="•"/>
+        <a:buFont typeface="Arial" pitchFamily="34" charset="0"/>
+        <a:buChar char=" "/>
         <a:defRPr sz="1800" kern="1200">
           <a:solidFill>
-            <a:schemeClr val="tx1"/>
+            <a:schemeClr val="tx1">
+              <a:lumMod val="85000"/>
+              <a:lumOff val="15000"/>
+            </a:schemeClr>
           </a:solidFill>
           <a:latin typeface="+mn-lt"/>
           <a:ea typeface="+mn-ea"/>
           <a:cs typeface="+mn-cs"/>
         </a:defRPr>
       </a:lvl5pPr>
-      <a:lvl6pPr marL="2514600" indent="-228600" algn="l" defTabSz="914400" rtl="0" eaLnBrk="1" latinLnBrk="0" hangingPunct="1">
+      <a:lvl6pPr marL="1200000" indent="-228600" algn="l" defTabSz="914400" rtl="0" eaLnBrk="1" latinLnBrk="0" hangingPunct="1">
         <a:lnSpc>
-          <a:spcPct val="90000"/>
+          <a:spcPct val="85000"/>
         </a:lnSpc>
         <a:spcBef>
-          <a:spcPts val="500"/>
+          <a:spcPts val="600"/>
         </a:spcBef>
-        <a:buFont typeface="Arial" panose="020B0604020202020204" pitchFamily="34" charset="0"/>
-        <a:buChar char="•"/>
+        <a:buFont typeface="Arial" pitchFamily="34" charset="0"/>
+        <a:buChar char=" "/>
         <a:defRPr sz="1800" kern="1200">
           <a:solidFill>
-            <a:schemeClr val="tx1"/>
+            <a:schemeClr val="tx1">
+              <a:lumMod val="85000"/>
+              <a:lumOff val="15000"/>
+            </a:schemeClr>
           </a:solidFill>
           <a:latin typeface="+mn-lt"/>
           <a:ea typeface="+mn-ea"/>
           <a:cs typeface="+mn-cs"/>
         </a:defRPr>
       </a:lvl6pPr>
-      <a:lvl7pPr marL="2971800" indent="-228600" algn="l" defTabSz="914400" rtl="0" eaLnBrk="1" latinLnBrk="0" hangingPunct="1">
+      <a:lvl7pPr marL="1400000" indent="-228600" algn="l" defTabSz="914400" rtl="0" eaLnBrk="1" latinLnBrk="0" hangingPunct="1">
         <a:lnSpc>
-          <a:spcPct val="90000"/>
+          <a:spcPct val="85000"/>
         </a:lnSpc>
         <a:spcBef>
-          <a:spcPts val="500"/>
+          <a:spcPts val="600"/>
         </a:spcBef>
-        <a:buFont typeface="Arial" panose="020B0604020202020204" pitchFamily="34" charset="0"/>
-        <a:buChar char="•"/>
+        <a:buFont typeface="Arial" pitchFamily="34" charset="0"/>
+        <a:buChar char=" "/>
         <a:defRPr sz="1800" kern="1200">
           <a:solidFill>
-            <a:schemeClr val="tx1"/>
+            <a:schemeClr val="tx1">
+              <a:lumMod val="85000"/>
+              <a:lumOff val="15000"/>
+            </a:schemeClr>
           </a:solidFill>
           <a:latin typeface="+mn-lt"/>
           <a:ea typeface="+mn-ea"/>
           <a:cs typeface="+mn-cs"/>
         </a:defRPr>
       </a:lvl7pPr>
-      <a:lvl8pPr marL="3429000" indent="-228600" algn="l" defTabSz="914400" rtl="0" eaLnBrk="1" latinLnBrk="0" hangingPunct="1">
+      <a:lvl8pPr marL="1600000" indent="-228600" algn="l" defTabSz="914400" rtl="0" eaLnBrk="1" latinLnBrk="0" hangingPunct="1">
         <a:lnSpc>
-          <a:spcPct val="90000"/>
+          <a:spcPct val="85000"/>
         </a:lnSpc>
         <a:spcBef>
-          <a:spcPts val="500"/>
+          <a:spcPts val="600"/>
         </a:spcBef>
-        <a:buFont typeface="Arial" panose="020B0604020202020204" pitchFamily="34" charset="0"/>
-        <a:buChar char="•"/>
+        <a:buFont typeface="Arial" pitchFamily="34" charset="0"/>
+        <a:buChar char=" "/>
         <a:defRPr sz="1800" kern="1200">
           <a:solidFill>
-            <a:schemeClr val="tx1"/>
+            <a:schemeClr val="tx1">
+              <a:lumMod val="85000"/>
+              <a:lumOff val="15000"/>
+            </a:schemeClr>
           </a:solidFill>
           <a:latin typeface="+mn-lt"/>
           <a:ea typeface="+mn-ea"/>
           <a:cs typeface="+mn-cs"/>
         </a:defRPr>
       </a:lvl8pPr>
-      <a:lvl9pPr marL="3886200" indent="-228600" algn="l" defTabSz="914400" rtl="0" eaLnBrk="1" latinLnBrk="0" hangingPunct="1">
+      <a:lvl9pPr marL="1800000" indent="-228600" algn="l" defTabSz="914400" rtl="0" eaLnBrk="1" latinLnBrk="0" hangingPunct="1">
         <a:lnSpc>
-          <a:spcPct val="90000"/>
+          <a:spcPct val="85000"/>
         </a:lnSpc>
         <a:spcBef>
-          <a:spcPts val="500"/>
+          <a:spcPts val="600"/>
         </a:spcBef>
-        <a:buFont typeface="Arial" panose="020B0604020202020204" pitchFamily="34" charset="0"/>
-        <a:buChar char="•"/>
+        <a:buFont typeface="Arial" pitchFamily="34" charset="0"/>
+        <a:buChar char=" "/>
         <a:defRPr sz="1800" kern="1200">
           <a:solidFill>
-            <a:schemeClr val="tx1"/>
+            <a:schemeClr val="tx1">
+              <a:lumMod val="85000"/>
+              <a:lumOff val="15000"/>
+            </a:schemeClr>
           </a:solidFill>
           <a:latin typeface="+mn-lt"/>
           <a:ea typeface="+mn-ea"/>
@@ -4215,7 +4277,7 @@
         <p:spPr/>
         <p:txBody>
           <a:bodyPr>
-            <a:normAutofit lnSpcReduction="10000"/>
+            <a:normAutofit fontScale="92500" lnSpcReduction="10000"/>
           </a:bodyPr>
           <a:lstStyle/>
           <a:p>
@@ -4377,7 +4439,7 @@
         <p:spPr/>
         <p:txBody>
           <a:bodyPr>
-            <a:normAutofit lnSpcReduction="10000"/>
+            <a:normAutofit fontScale="92500" lnSpcReduction="10000"/>
           </a:bodyPr>
           <a:lstStyle/>
           <a:p>
@@ -5638,9 +5700,9 @@
 </file>
 
 <file path=ppt/theme/theme1.xml><?xml version="1.0" encoding="utf-8"?>
-<a:theme xmlns:a="http://schemas.openxmlformats.org/drawingml/2006/main" name="Office Theme">
+<a:theme xmlns:a="http://schemas.openxmlformats.org/drawingml/2006/main" name="Metropolitan">
   <a:themeElements>
-    <a:clrScheme name="Office">
+    <a:clrScheme name="Metropolitan">
       <a:dk1>
         <a:sysClr val="windowText" lastClr="000000"/>
       </a:dk1>
@@ -5648,44 +5710,44 @@
         <a:sysClr val="window" lastClr="FFFFFF"/>
       </a:lt1>
       <a:dk2>
-        <a:srgbClr val="44546A"/>
+        <a:srgbClr val="162F33"/>
       </a:dk2>
       <a:lt2>
-        <a:srgbClr val="E7E6E6"/>
+        <a:srgbClr val="EAF0E0"/>
       </a:lt2>
       <a:accent1>
-        <a:srgbClr val="4472C4"/>
+        <a:srgbClr val="50B4C8"/>
       </a:accent1>
       <a:accent2>
-        <a:srgbClr val="ED7D31"/>
+        <a:srgbClr val="A8B97F"/>
       </a:accent2>
       <a:accent3>
-        <a:srgbClr val="A5A5A5"/>
+        <a:srgbClr val="9B9256"/>
       </a:accent3>
       <a:accent4>
-        <a:srgbClr val="FFC000"/>
+        <a:srgbClr val="657689"/>
       </a:accent4>
       <a:accent5>
-        <a:srgbClr val="5B9BD5"/>
+        <a:srgbClr val="7A855D"/>
       </a:accent5>
       <a:accent6>
-        <a:srgbClr val="70AD47"/>
+        <a:srgbClr val="84AC9D"/>
       </a:accent6>
       <a:hlink>
-        <a:srgbClr val="0563C1"/>
+        <a:srgbClr val="2370CD"/>
       </a:hlink>
       <a:folHlink>
-        <a:srgbClr val="954F72"/>
+        <a:srgbClr val="877589"/>
       </a:folHlink>
     </a:clrScheme>
-    <a:fontScheme name="Office">
+    <a:fontScheme name="Metropolitan">
       <a:majorFont>
         <a:latin typeface="Calibri Light" panose="020F0302020204030204"/>
         <a:ea typeface=""/>
         <a:cs typeface=""/>
-        <a:font script="Jpan" typeface="游ゴシック Light"/>
+        <a:font script="Jpan" typeface="ＭＳ Ｐゴシック"/>
         <a:font script="Hang" typeface="맑은 고딕"/>
-        <a:font script="Hans" typeface="等线 Light"/>
+        <a:font script="Hans" typeface="宋体"/>
         <a:font script="Hant" typeface="新細明體"/>
         <a:font script="Arab" typeface="Times New Roman"/>
         <a:font script="Hebr" typeface="Times New Roman"/>
@@ -5713,39 +5775,22 @@
         <a:font script="Viet" typeface="Times New Roman"/>
         <a:font script="Uigh" typeface="Microsoft Uighur"/>
         <a:font script="Geor" typeface="Sylfaen"/>
-        <a:font script="Armn" typeface="Arial"/>
-        <a:font script="Bugi" typeface="Leelawadee UI"/>
-        <a:font script="Bopo" typeface="Microsoft JhengHei"/>
-        <a:font script="Java" typeface="Javanese Text"/>
-        <a:font script="Lisu" typeface="Segoe UI"/>
-        <a:font script="Mymr" typeface="Myanmar Text"/>
-        <a:font script="Nkoo" typeface="Ebrima"/>
-        <a:font script="Olck" typeface="Nirmala UI"/>
-        <a:font script="Osma" typeface="Ebrima"/>
-        <a:font script="Phag" typeface="Phagspa"/>
-        <a:font script="Syrn" typeface="Estrangelo Edessa"/>
-        <a:font script="Syrj" typeface="Estrangelo Edessa"/>
-        <a:font script="Syre" typeface="Estrangelo Edessa"/>
-        <a:font script="Sora" typeface="Nirmala UI"/>
-        <a:font script="Tale" typeface="Microsoft Tai Le"/>
-        <a:font script="Talu" typeface="Microsoft New Tai Lue"/>
-        <a:font script="Tfng" typeface="Ebrima"/>
       </a:majorFont>
       <a:minorFont>
-        <a:latin typeface="Calibri" panose="020F0502020204030204"/>
+        <a:latin typeface="Calibri Light" panose="020F0302020204030204"/>
         <a:ea typeface=""/>
         <a:cs typeface=""/>
-        <a:font script="Jpan" typeface="游ゴシック"/>
+        <a:font script="Jpan" typeface="ＭＳ Ｐゴシック"/>
         <a:font script="Hang" typeface="맑은 고딕"/>
-        <a:font script="Hans" typeface="等线"/>
+        <a:font script="Hans" typeface="宋体"/>
         <a:font script="Hant" typeface="新細明體"/>
-        <a:font script="Arab" typeface="Arial"/>
-        <a:font script="Hebr" typeface="Arial"/>
-        <a:font script="Thai" typeface="Cordia New"/>
+        <a:font script="Arab" typeface="Times New Roman"/>
+        <a:font script="Hebr" typeface="Times New Roman"/>
+        <a:font script="Thai" typeface="Angsana New"/>
         <a:font script="Ethi" typeface="Nyala"/>
         <a:font script="Beng" typeface="Vrinda"/>
         <a:font script="Gujr" typeface="Shruti"/>
-        <a:font script="Khmr" typeface="DaunPenh"/>
+        <a:font script="Khmr" typeface="MoolBoran"/>
         <a:font script="Knda" typeface="Tunga"/>
         <a:font script="Guru" typeface="Raavi"/>
         <a:font script="Cans" typeface="Euphemia"/>
@@ -5762,29 +5807,12 @@
         <a:font script="Laoo" typeface="DokChampa"/>
         <a:font script="Sinh" typeface="Iskoola Pota"/>
         <a:font script="Mong" typeface="Mongolian Baiti"/>
-        <a:font script="Viet" typeface="Arial"/>
+        <a:font script="Viet" typeface="Times New Roman"/>
         <a:font script="Uigh" typeface="Microsoft Uighur"/>
         <a:font script="Geor" typeface="Sylfaen"/>
-        <a:font script="Armn" typeface="Arial"/>
-        <a:font script="Bugi" typeface="Leelawadee UI"/>
-        <a:font script="Bopo" typeface="Microsoft JhengHei"/>
-        <a:font script="Java" typeface="Javanese Text"/>
-        <a:font script="Lisu" typeface="Segoe UI"/>
-        <a:font script="Mymr" typeface="Myanmar Text"/>
-        <a:font script="Nkoo" typeface="Ebrima"/>
-        <a:font script="Olck" typeface="Nirmala UI"/>
-        <a:font script="Osma" typeface="Ebrima"/>
-        <a:font script="Phag" typeface="Phagspa"/>
-        <a:font script="Syrn" typeface="Estrangelo Edessa"/>
-        <a:font script="Syrj" typeface="Estrangelo Edessa"/>
-        <a:font script="Syre" typeface="Estrangelo Edessa"/>
-        <a:font script="Sora" typeface="Nirmala UI"/>
-        <a:font script="Tale" typeface="Microsoft Tai Le"/>
-        <a:font script="Talu" typeface="Microsoft New Tai Lue"/>
-        <a:font script="Tfng" typeface="Ebrima"/>
       </a:minorFont>
     </a:fontScheme>
-    <a:fmtScheme name="Office">
+    <a:fmtScheme name="Metropolitan">
       <a:fillStyleLst>
         <a:solidFill>
           <a:schemeClr val="phClr"/>
@@ -5793,76 +5821,73 @@
           <a:gsLst>
             <a:gs pos="0">
               <a:schemeClr val="phClr">
+                <a:tint val="70000"/>
+                <a:satMod val="100000"/>
                 <a:lumMod val="110000"/>
-                <a:satMod val="105000"/>
-                <a:tint val="67000"/>
               </a:schemeClr>
             </a:gs>
             <a:gs pos="50000">
               <a:schemeClr val="phClr">
+                <a:tint val="75000"/>
+                <a:satMod val="101000"/>
                 <a:lumMod val="105000"/>
-                <a:satMod val="103000"/>
-                <a:tint val="73000"/>
               </a:schemeClr>
             </a:gs>
             <a:gs pos="100000">
               <a:schemeClr val="phClr">
+                <a:tint val="82000"/>
+                <a:satMod val="104000"/>
                 <a:lumMod val="105000"/>
-                <a:satMod val="109000"/>
-                <a:tint val="81000"/>
               </a:schemeClr>
             </a:gs>
           </a:gsLst>
-          <a:lin ang="5400000" scaled="0"/>
+          <a:lin ang="2700000" scaled="0"/>
         </a:gradFill>
         <a:gradFill rotWithShape="1">
           <a:gsLst>
             <a:gs pos="0">
               <a:schemeClr val="phClr">
-                <a:satMod val="103000"/>
+                <a:tint val="97000"/>
+                <a:satMod val="100000"/>
                 <a:lumMod val="102000"/>
-                <a:tint val="94000"/>
               </a:schemeClr>
             </a:gs>
             <a:gs pos="50000">
               <a:schemeClr val="phClr">
-                <a:satMod val="110000"/>
+                <a:shade val="100000"/>
+                <a:satMod val="100000"/>
                 <a:lumMod val="100000"/>
-                <a:shade val="100000"/>
               </a:schemeClr>
             </a:gs>
             <a:gs pos="100000">
               <a:schemeClr val="phClr">
+                <a:shade val="80000"/>
+                <a:satMod val="100000"/>
                 <a:lumMod val="99000"/>
-                <a:satMod val="120000"/>
-                <a:shade val="78000"/>
               </a:schemeClr>
             </a:gs>
           </a:gsLst>
-          <a:lin ang="5400000" scaled="0"/>
+          <a:lin ang="2700000" scaled="0"/>
         </a:gradFill>
       </a:fillStyleLst>
       <a:lnStyleLst>
-        <a:ln w="6350" cap="flat" cmpd="sng" algn="ctr">
+        <a:ln w="9525" cap="flat" cmpd="sng" algn="ctr">
           <a:solidFill>
             <a:schemeClr val="phClr"/>
           </a:solidFill>
           <a:prstDash val="solid"/>
-          <a:miter lim="800000"/>
         </a:ln>
         <a:ln w="12700" cap="flat" cmpd="sng" algn="ctr">
           <a:solidFill>
             <a:schemeClr val="phClr"/>
           </a:solidFill>
           <a:prstDash val="solid"/>
-          <a:miter lim="800000"/>
         </a:ln>
         <a:ln w="19050" cap="flat" cmpd="sng" algn="ctr">
           <a:solidFill>
             <a:schemeClr val="phClr"/>
           </a:solidFill>
           <a:prstDash val="solid"/>
-          <a:miter lim="800000"/>
         </a:ln>
       </a:lnStyleLst>
       <a:effectStyleLst>
@@ -5892,33 +5917,12 @@
             <a:satMod val="170000"/>
           </a:schemeClr>
         </a:solidFill>
-        <a:gradFill rotWithShape="1">
-          <a:gsLst>
-            <a:gs pos="0">
-              <a:schemeClr val="phClr">
-                <a:tint val="93000"/>
-                <a:satMod val="150000"/>
-                <a:shade val="98000"/>
-                <a:lumMod val="102000"/>
-              </a:schemeClr>
-            </a:gs>
-            <a:gs pos="50000">
-              <a:schemeClr val="phClr">
-                <a:tint val="98000"/>
-                <a:satMod val="130000"/>
-                <a:shade val="90000"/>
-                <a:lumMod val="103000"/>
-              </a:schemeClr>
-            </a:gs>
-            <a:gs pos="100000">
-              <a:schemeClr val="phClr">
-                <a:shade val="63000"/>
-                <a:satMod val="120000"/>
-              </a:schemeClr>
-            </a:gs>
-          </a:gsLst>
-          <a:lin ang="5400000" scaled="0"/>
-        </a:gradFill>
+        <a:solidFill>
+          <a:schemeClr val="phClr">
+            <a:shade val="95000"/>
+            <a:satMod val="170000"/>
+          </a:schemeClr>
+        </a:solidFill>
       </a:bgFillStyleLst>
     </a:fmtScheme>
   </a:themeElements>
@@ -5926,7 +5930,7 @@
   <a:extraClrSchemeLst/>
   <a:extLst>
     <a:ext uri="{05A4C25C-085E-4340-85A3-A5531E510DB2}">
-      <thm15:themeFamily xmlns:thm15="http://schemas.microsoft.com/office/thememl/2012/main" name="Office Theme" id="{62F939B6-93AF-4DB8-9C6B-D6C7DFDC589F}" vid="{4A3C46E8-61CC-4603-A589-7422A47A8E4A}"/>
+      <thm15:themeFamily xmlns:thm15="http://schemas.microsoft.com/office/thememl/2012/main" name="Metropolitan" id="{4C5440D6-04D2-4954-96CF-F251137069B2}" vid="{79CFCA13-9412-4290-BB4B-85112F88857B}"/>
     </a:ext>
   </a:extLst>
 </a:theme>

</xml_diff>